<commit_message>
add the new images
</commit_message>
<xml_diff>
--- a/doc/images/mpi4py.pptx
+++ b/doc/images/mpi4py.pptx
@@ -6,6 +6,9 @@
   </p:sldMasterIdLst>
   <p:sldIdLst>
     <p:sldId id="256" r:id="rId2"/>
+    <p:sldId id="257" r:id="rId3"/>
+    <p:sldId id="258" r:id="rId4"/>
+    <p:sldId id="259" r:id="rId5"/>
   </p:sldIdLst>
   <p:sldSz cx="12192000" cy="6858000"/>
   <p:notesSz cx="6858000" cy="9144000"/>
@@ -3326,1041 +3329,3770 @@
           <a:chExt cx="0" cy="0"/>
         </a:xfrm>
       </p:grpSpPr>
-      <p:grpSp>
-        <p:nvGrpSpPr>
-          <p:cNvPr id="31" name="Group 30">
-            <a:extLst>
-              <a:ext uri="{FF2B5EF4-FFF2-40B4-BE49-F238E27FC236}">
-                <a16:creationId xmlns:a16="http://schemas.microsoft.com/office/drawing/2014/main" id="{64239AC2-5C03-904E-AE55-F11C91B157A4}"/>
-              </a:ext>
-            </a:extLst>
-          </p:cNvPr>
-          <p:cNvGrpSpPr/>
+      <p:sp>
+        <p:nvSpPr>
+          <p:cNvPr id="4" name="Rounded Rectangle 3">
+            <a:extLst>
+              <a:ext uri="{FF2B5EF4-FFF2-40B4-BE49-F238E27FC236}">
+                <a16:creationId xmlns:a16="http://schemas.microsoft.com/office/drawing/2014/main" id="{8ACB91C4-10F1-B74A-A783-8EAF058E8AA7}"/>
+              </a:ext>
+            </a:extLst>
+          </p:cNvPr>
+          <p:cNvSpPr/>
           <p:nvPr/>
-        </p:nvGrpSpPr>
-        <p:grpSpPr>
+        </p:nvSpPr>
+        <p:spPr>
           <a:xfrm>
-            <a:off x="1842388" y="788039"/>
-            <a:ext cx="4574245" cy="4299979"/>
-            <a:chOff x="1842388" y="788039"/>
-            <a:chExt cx="4574245" cy="4299979"/>
-          </a:xfrm>
-        </p:grpSpPr>
-        <p:sp>
-          <p:nvSpPr>
-            <p:cNvPr id="4" name="Rounded Rectangle 3">
-              <a:extLst>
-                <a:ext uri="{FF2B5EF4-FFF2-40B4-BE49-F238E27FC236}">
-                  <a16:creationId xmlns:a16="http://schemas.microsoft.com/office/drawing/2014/main" id="{8ACB91C4-10F1-B74A-A783-8EAF058E8AA7}"/>
-                </a:ext>
-              </a:extLst>
-            </p:cNvPr>
-            <p:cNvSpPr/>
-            <p:nvPr/>
-          </p:nvSpPr>
-          <p:spPr>
-            <a:xfrm>
-              <a:off x="3851565" y="788039"/>
-              <a:ext cx="641267" cy="641267"/>
-            </a:xfrm>
-            <a:prstGeom prst="roundRect">
-              <a:avLst/>
-            </a:prstGeom>
-            <a:gradFill flip="none" rotWithShape="1">
-              <a:gsLst>
-                <a:gs pos="0">
-                  <a:schemeClr val="accent5">
-                    <a:lumMod val="5000"/>
-                    <a:lumOff val="95000"/>
-                  </a:schemeClr>
-                </a:gs>
-                <a:gs pos="74000">
-                  <a:schemeClr val="accent5">
-                    <a:lumMod val="45000"/>
-                    <a:lumOff val="55000"/>
-                  </a:schemeClr>
-                </a:gs>
-                <a:gs pos="83000">
-                  <a:schemeClr val="accent5">
-                    <a:lumMod val="45000"/>
-                    <a:lumOff val="55000"/>
-                  </a:schemeClr>
-                </a:gs>
-                <a:gs pos="100000">
-                  <a:schemeClr val="accent5">
-                    <a:lumMod val="30000"/>
-                    <a:lumOff val="70000"/>
-                  </a:schemeClr>
-                </a:gs>
-              </a:gsLst>
-              <a:lin ang="5400000" scaled="1"/>
-              <a:tileRect/>
-            </a:gradFill>
-          </p:spPr>
-          <p:style>
-            <a:lnRef idx="2">
-              <a:schemeClr val="accent1">
-                <a:shade val="50000"/>
-              </a:schemeClr>
-            </a:lnRef>
-            <a:fillRef idx="1">
-              <a:schemeClr val="accent1"/>
-            </a:fillRef>
-            <a:effectRef idx="0">
-              <a:schemeClr val="accent1"/>
-            </a:effectRef>
-            <a:fontRef idx="minor">
-              <a:schemeClr val="lt1"/>
-            </a:fontRef>
-          </p:style>
-          <p:txBody>
-            <a:bodyPr rtlCol="0" anchor="ctr"/>
-            <a:lstStyle/>
-            <a:p>
-              <a:pPr algn="ctr"/>
-              <a:r>
-                <a:rPr lang="en-US" dirty="0">
-                  <a:solidFill>
-                    <a:schemeClr val="tx1"/>
-                  </a:solidFill>
-                </a:rPr>
-                <a:t>D0</a:t>
-              </a:r>
-            </a:p>
-          </p:txBody>
-        </p:sp>
-        <p:sp>
-          <p:nvSpPr>
-            <p:cNvPr id="5" name="Rounded Rectangle 4">
-              <a:extLst>
-                <a:ext uri="{FF2B5EF4-FFF2-40B4-BE49-F238E27FC236}">
-                  <a16:creationId xmlns:a16="http://schemas.microsoft.com/office/drawing/2014/main" id="{AE5C9134-3A3F-1C4E-82C9-B9EF0BF9D813}"/>
-                </a:ext>
-              </a:extLst>
-            </p:cNvPr>
-            <p:cNvSpPr/>
-            <p:nvPr/>
-          </p:nvSpPr>
-          <p:spPr>
-            <a:xfrm>
-              <a:off x="4492832" y="788039"/>
-              <a:ext cx="641267" cy="641267"/>
-            </a:xfrm>
-            <a:prstGeom prst="roundRect">
-              <a:avLst/>
-            </a:prstGeom>
-            <a:gradFill flip="none" rotWithShape="1">
-              <a:gsLst>
-                <a:gs pos="0">
-                  <a:schemeClr val="accent5">
-                    <a:lumMod val="5000"/>
-                    <a:lumOff val="95000"/>
-                  </a:schemeClr>
-                </a:gs>
-                <a:gs pos="74000">
-                  <a:schemeClr val="accent5">
-                    <a:lumMod val="45000"/>
-                    <a:lumOff val="55000"/>
-                  </a:schemeClr>
-                </a:gs>
-                <a:gs pos="83000">
-                  <a:schemeClr val="accent5">
-                    <a:lumMod val="45000"/>
-                    <a:lumOff val="55000"/>
-                  </a:schemeClr>
-                </a:gs>
-                <a:gs pos="100000">
-                  <a:schemeClr val="accent5">
-                    <a:lumMod val="30000"/>
-                    <a:lumOff val="70000"/>
-                  </a:schemeClr>
-                </a:gs>
-              </a:gsLst>
-              <a:lin ang="5400000" scaled="1"/>
-              <a:tileRect/>
-            </a:gradFill>
-          </p:spPr>
-          <p:style>
-            <a:lnRef idx="2">
-              <a:schemeClr val="accent1">
-                <a:shade val="50000"/>
-              </a:schemeClr>
-            </a:lnRef>
-            <a:fillRef idx="1">
-              <a:schemeClr val="accent1"/>
-            </a:fillRef>
-            <a:effectRef idx="0">
-              <a:schemeClr val="accent1"/>
-            </a:effectRef>
-            <a:fontRef idx="minor">
-              <a:schemeClr val="lt1"/>
-            </a:fontRef>
-          </p:style>
-          <p:txBody>
-            <a:bodyPr rtlCol="0" anchor="ctr"/>
-            <a:lstStyle/>
-            <a:p>
-              <a:pPr algn="ctr"/>
-              <a:r>
-                <a:rPr lang="en-US" dirty="0">
-                  <a:solidFill>
-                    <a:schemeClr val="tx1"/>
-                  </a:solidFill>
-                </a:rPr>
-                <a:t>D1</a:t>
-              </a:r>
-            </a:p>
-          </p:txBody>
-        </p:sp>
-        <p:sp>
-          <p:nvSpPr>
-            <p:cNvPr id="6" name="Rounded Rectangle 5">
-              <a:extLst>
-                <a:ext uri="{FF2B5EF4-FFF2-40B4-BE49-F238E27FC236}">
-                  <a16:creationId xmlns:a16="http://schemas.microsoft.com/office/drawing/2014/main" id="{78DBB200-8DE5-B045-997D-B946D9EE0AE8}"/>
-                </a:ext>
-              </a:extLst>
-            </p:cNvPr>
-            <p:cNvSpPr/>
-            <p:nvPr/>
-          </p:nvSpPr>
-          <p:spPr>
-            <a:xfrm>
-              <a:off x="5134099" y="788039"/>
-              <a:ext cx="641267" cy="641267"/>
-            </a:xfrm>
-            <a:prstGeom prst="roundRect">
-              <a:avLst/>
-            </a:prstGeom>
-            <a:gradFill flip="none" rotWithShape="1">
-              <a:gsLst>
-                <a:gs pos="0">
-                  <a:schemeClr val="accent5">
-                    <a:lumMod val="5000"/>
-                    <a:lumOff val="95000"/>
-                  </a:schemeClr>
-                </a:gs>
-                <a:gs pos="74000">
-                  <a:schemeClr val="accent5">
-                    <a:lumMod val="45000"/>
-                    <a:lumOff val="55000"/>
-                  </a:schemeClr>
-                </a:gs>
-                <a:gs pos="83000">
-                  <a:schemeClr val="accent5">
-                    <a:lumMod val="45000"/>
-                    <a:lumOff val="55000"/>
-                  </a:schemeClr>
-                </a:gs>
-                <a:gs pos="100000">
-                  <a:schemeClr val="accent5">
-                    <a:lumMod val="30000"/>
-                    <a:lumOff val="70000"/>
-                  </a:schemeClr>
-                </a:gs>
-              </a:gsLst>
-              <a:lin ang="5400000" scaled="1"/>
-              <a:tileRect/>
-            </a:gradFill>
-          </p:spPr>
-          <p:style>
-            <a:lnRef idx="2">
-              <a:schemeClr val="accent1">
-                <a:shade val="50000"/>
-              </a:schemeClr>
-            </a:lnRef>
-            <a:fillRef idx="1">
-              <a:schemeClr val="accent1"/>
-            </a:fillRef>
-            <a:effectRef idx="0">
-              <a:schemeClr val="accent1"/>
-            </a:effectRef>
-            <a:fontRef idx="minor">
-              <a:schemeClr val="lt1"/>
-            </a:fontRef>
-          </p:style>
-          <p:txBody>
-            <a:bodyPr rtlCol="0" anchor="ctr"/>
-            <a:lstStyle/>
-            <a:p>
-              <a:pPr algn="ctr"/>
-              <a:r>
-                <a:rPr lang="en-US" dirty="0">
-                  <a:solidFill>
-                    <a:schemeClr val="tx1"/>
-                  </a:solidFill>
-                </a:rPr>
-                <a:t>D2</a:t>
-              </a:r>
-            </a:p>
-          </p:txBody>
-        </p:sp>
-        <p:sp>
-          <p:nvSpPr>
-            <p:cNvPr id="7" name="Rounded Rectangle 6">
-              <a:extLst>
-                <a:ext uri="{FF2B5EF4-FFF2-40B4-BE49-F238E27FC236}">
-                  <a16:creationId xmlns:a16="http://schemas.microsoft.com/office/drawing/2014/main" id="{B3DCAD2F-EE91-9945-9E76-EAA2D17F9B79}"/>
-                </a:ext>
-              </a:extLst>
-            </p:cNvPr>
-            <p:cNvSpPr/>
-            <p:nvPr/>
-          </p:nvSpPr>
-          <p:spPr>
-            <a:xfrm>
-              <a:off x="5775366" y="788039"/>
-              <a:ext cx="641267" cy="641267"/>
-            </a:xfrm>
-            <a:prstGeom prst="roundRect">
-              <a:avLst/>
-            </a:prstGeom>
-            <a:gradFill flip="none" rotWithShape="1">
-              <a:gsLst>
-                <a:gs pos="0">
-                  <a:schemeClr val="accent5">
-                    <a:lumMod val="5000"/>
-                    <a:lumOff val="95000"/>
-                  </a:schemeClr>
-                </a:gs>
-                <a:gs pos="74000">
-                  <a:schemeClr val="accent5">
-                    <a:lumMod val="45000"/>
-                    <a:lumOff val="55000"/>
-                  </a:schemeClr>
-                </a:gs>
-                <a:gs pos="83000">
-                  <a:schemeClr val="accent5">
-                    <a:lumMod val="45000"/>
-                    <a:lumOff val="55000"/>
-                  </a:schemeClr>
-                </a:gs>
-                <a:gs pos="100000">
-                  <a:schemeClr val="accent5">
-                    <a:lumMod val="30000"/>
-                    <a:lumOff val="70000"/>
-                  </a:schemeClr>
-                </a:gs>
-              </a:gsLst>
-              <a:lin ang="5400000" scaled="1"/>
-              <a:tileRect/>
-            </a:gradFill>
-          </p:spPr>
-          <p:style>
-            <a:lnRef idx="2">
-              <a:schemeClr val="accent1">
-                <a:shade val="50000"/>
-              </a:schemeClr>
-            </a:lnRef>
-            <a:fillRef idx="1">
-              <a:schemeClr val="accent1"/>
-            </a:fillRef>
-            <a:effectRef idx="0">
-              <a:schemeClr val="accent1"/>
-            </a:effectRef>
-            <a:fontRef idx="minor">
-              <a:schemeClr val="lt1"/>
-            </a:fontRef>
-          </p:style>
-          <p:txBody>
-            <a:bodyPr rtlCol="0" anchor="ctr"/>
-            <a:lstStyle/>
-            <a:p>
-              <a:pPr algn="ctr"/>
-              <a:r>
-                <a:rPr lang="en-US" dirty="0">
-                  <a:solidFill>
-                    <a:schemeClr val="tx1"/>
-                  </a:solidFill>
-                </a:rPr>
-                <a:t>D4</a:t>
-              </a:r>
-            </a:p>
-          </p:txBody>
-        </p:sp>
-        <p:sp>
-          <p:nvSpPr>
-            <p:cNvPr id="8" name="Rounded Rectangle 7">
-              <a:extLst>
-                <a:ext uri="{FF2B5EF4-FFF2-40B4-BE49-F238E27FC236}">
-                  <a16:creationId xmlns:a16="http://schemas.microsoft.com/office/drawing/2014/main" id="{D11A220F-CE94-E04D-B63F-D49E0A1C4B89}"/>
-                </a:ext>
-              </a:extLst>
-            </p:cNvPr>
-            <p:cNvSpPr/>
-            <p:nvPr/>
-          </p:nvSpPr>
-          <p:spPr>
-            <a:xfrm>
-              <a:off x="2982184" y="2140156"/>
-              <a:ext cx="641267" cy="641267"/>
-            </a:xfrm>
-            <a:prstGeom prst="roundRect">
-              <a:avLst/>
-            </a:prstGeom>
-            <a:gradFill flip="none" rotWithShape="1">
-              <a:gsLst>
-                <a:gs pos="0">
-                  <a:schemeClr val="accent5">
-                    <a:lumMod val="5000"/>
-                    <a:lumOff val="95000"/>
-                  </a:schemeClr>
-                </a:gs>
-                <a:gs pos="74000">
-                  <a:schemeClr val="accent5">
-                    <a:lumMod val="45000"/>
-                    <a:lumOff val="55000"/>
-                  </a:schemeClr>
-                </a:gs>
-                <a:gs pos="83000">
-                  <a:schemeClr val="accent5">
-                    <a:lumMod val="45000"/>
-                    <a:lumOff val="55000"/>
-                  </a:schemeClr>
-                </a:gs>
-                <a:gs pos="100000">
-                  <a:schemeClr val="accent5">
-                    <a:lumMod val="30000"/>
-                    <a:lumOff val="70000"/>
-                  </a:schemeClr>
-                </a:gs>
-              </a:gsLst>
-              <a:lin ang="5400000" scaled="1"/>
-              <a:tileRect/>
-            </a:gradFill>
-          </p:spPr>
-          <p:style>
-            <a:lnRef idx="2">
-              <a:schemeClr val="accent1">
-                <a:shade val="50000"/>
-              </a:schemeClr>
-            </a:lnRef>
-            <a:fillRef idx="1">
-              <a:schemeClr val="accent1"/>
-            </a:fillRef>
-            <a:effectRef idx="0">
-              <a:schemeClr val="accent1"/>
-            </a:effectRef>
-            <a:fontRef idx="minor">
-              <a:schemeClr val="lt1"/>
-            </a:fontRef>
-          </p:style>
-          <p:txBody>
-            <a:bodyPr rtlCol="0" anchor="ctr"/>
-            <a:lstStyle/>
-            <a:p>
-              <a:pPr algn="ctr"/>
-              <a:r>
-                <a:rPr lang="en-US" dirty="0">
-                  <a:solidFill>
-                    <a:schemeClr val="tx1"/>
-                  </a:solidFill>
-                </a:rPr>
-                <a:t>D0</a:t>
-              </a:r>
-            </a:p>
-          </p:txBody>
-        </p:sp>
-        <p:sp>
-          <p:nvSpPr>
-            <p:cNvPr id="10" name="Rounded Rectangle 9">
-              <a:extLst>
-                <a:ext uri="{FF2B5EF4-FFF2-40B4-BE49-F238E27FC236}">
-                  <a16:creationId xmlns:a16="http://schemas.microsoft.com/office/drawing/2014/main" id="{F2DD7FB6-F02B-A644-AAA5-3F6B3ED31FCE}"/>
-                </a:ext>
-              </a:extLst>
-            </p:cNvPr>
-            <p:cNvSpPr/>
-            <p:nvPr/>
-          </p:nvSpPr>
-          <p:spPr>
-            <a:xfrm>
-              <a:off x="2983485" y="4446751"/>
-              <a:ext cx="641267" cy="641267"/>
-            </a:xfrm>
-            <a:prstGeom prst="roundRect">
-              <a:avLst/>
-            </a:prstGeom>
-            <a:gradFill flip="none" rotWithShape="1">
-              <a:gsLst>
-                <a:gs pos="0">
-                  <a:schemeClr val="accent5">
-                    <a:lumMod val="5000"/>
-                    <a:lumOff val="95000"/>
-                  </a:schemeClr>
-                </a:gs>
-                <a:gs pos="74000">
-                  <a:schemeClr val="accent5">
-                    <a:lumMod val="45000"/>
-                    <a:lumOff val="55000"/>
-                  </a:schemeClr>
-                </a:gs>
-                <a:gs pos="83000">
-                  <a:schemeClr val="accent5">
-                    <a:lumMod val="45000"/>
-                    <a:lumOff val="55000"/>
-                  </a:schemeClr>
-                </a:gs>
-                <a:gs pos="100000">
-                  <a:schemeClr val="accent5">
-                    <a:lumMod val="30000"/>
-                    <a:lumOff val="70000"/>
-                  </a:schemeClr>
-                </a:gs>
-              </a:gsLst>
-              <a:lin ang="5400000" scaled="1"/>
-              <a:tileRect/>
-            </a:gradFill>
-          </p:spPr>
-          <p:style>
-            <a:lnRef idx="2">
-              <a:schemeClr val="accent1">
-                <a:shade val="50000"/>
-              </a:schemeClr>
-            </a:lnRef>
-            <a:fillRef idx="1">
-              <a:schemeClr val="accent1"/>
-            </a:fillRef>
-            <a:effectRef idx="0">
-              <a:schemeClr val="accent1"/>
-            </a:effectRef>
-            <a:fontRef idx="minor">
-              <a:schemeClr val="lt1"/>
-            </a:fontRef>
-          </p:style>
-          <p:txBody>
-            <a:bodyPr rtlCol="0" anchor="ctr"/>
-            <a:lstStyle/>
-            <a:p>
-              <a:pPr algn="ctr"/>
-              <a:r>
-                <a:rPr lang="en-US" dirty="0">
-                  <a:solidFill>
-                    <a:schemeClr val="tx1"/>
-                  </a:solidFill>
-                </a:rPr>
-                <a:t>D3</a:t>
-              </a:r>
-            </a:p>
-          </p:txBody>
-        </p:sp>
-        <p:sp>
-          <p:nvSpPr>
-            <p:cNvPr id="11" name="Rounded Rectangle 10">
-              <a:extLst>
-                <a:ext uri="{FF2B5EF4-FFF2-40B4-BE49-F238E27FC236}">
-                  <a16:creationId xmlns:a16="http://schemas.microsoft.com/office/drawing/2014/main" id="{4C8EE817-3131-6D4D-959D-EB2EE5E57F08}"/>
-                </a:ext>
-              </a:extLst>
-            </p:cNvPr>
-            <p:cNvSpPr/>
-            <p:nvPr/>
-          </p:nvSpPr>
-          <p:spPr>
-            <a:xfrm>
-              <a:off x="2983486" y="3677886"/>
-              <a:ext cx="641267" cy="641267"/>
-            </a:xfrm>
-            <a:prstGeom prst="roundRect">
-              <a:avLst/>
-            </a:prstGeom>
-            <a:gradFill flip="none" rotWithShape="1">
-              <a:gsLst>
-                <a:gs pos="0">
-                  <a:schemeClr val="accent5">
-                    <a:lumMod val="5000"/>
-                    <a:lumOff val="95000"/>
-                  </a:schemeClr>
-                </a:gs>
-                <a:gs pos="74000">
-                  <a:schemeClr val="accent5">
-                    <a:lumMod val="45000"/>
-                    <a:lumOff val="55000"/>
-                  </a:schemeClr>
-                </a:gs>
-                <a:gs pos="83000">
-                  <a:schemeClr val="accent5">
-                    <a:lumMod val="45000"/>
-                    <a:lumOff val="55000"/>
-                  </a:schemeClr>
-                </a:gs>
-                <a:gs pos="100000">
-                  <a:schemeClr val="accent5">
-                    <a:lumMod val="30000"/>
-                    <a:lumOff val="70000"/>
-                  </a:schemeClr>
-                </a:gs>
-              </a:gsLst>
-              <a:lin ang="5400000" scaled="1"/>
-              <a:tileRect/>
-            </a:gradFill>
-          </p:spPr>
-          <p:style>
-            <a:lnRef idx="2">
-              <a:schemeClr val="accent1">
-                <a:shade val="50000"/>
-              </a:schemeClr>
-            </a:lnRef>
-            <a:fillRef idx="1">
-              <a:schemeClr val="accent1"/>
-            </a:fillRef>
-            <a:effectRef idx="0">
-              <a:schemeClr val="accent1"/>
-            </a:effectRef>
-            <a:fontRef idx="minor">
-              <a:schemeClr val="lt1"/>
-            </a:fontRef>
-          </p:style>
-          <p:txBody>
-            <a:bodyPr rtlCol="0" anchor="ctr"/>
-            <a:lstStyle/>
-            <a:p>
-              <a:pPr algn="ctr"/>
-              <a:r>
-                <a:rPr lang="en-US" dirty="0">
-                  <a:solidFill>
-                    <a:schemeClr val="tx1"/>
-                  </a:solidFill>
-                </a:rPr>
-                <a:t>D2</a:t>
-              </a:r>
-            </a:p>
-          </p:txBody>
-        </p:sp>
-        <p:sp>
-          <p:nvSpPr>
-            <p:cNvPr id="12" name="Rounded Rectangle 11">
-              <a:extLst>
-                <a:ext uri="{FF2B5EF4-FFF2-40B4-BE49-F238E27FC236}">
-                  <a16:creationId xmlns:a16="http://schemas.microsoft.com/office/drawing/2014/main" id="{CBC73F86-3905-F947-96B1-9BC6C1C3EF70}"/>
-                </a:ext>
-              </a:extLst>
-            </p:cNvPr>
-            <p:cNvSpPr/>
-            <p:nvPr/>
-          </p:nvSpPr>
-          <p:spPr>
-            <a:xfrm>
-              <a:off x="2983487" y="2909021"/>
-              <a:ext cx="641267" cy="641267"/>
-            </a:xfrm>
-            <a:prstGeom prst="roundRect">
-              <a:avLst/>
-            </a:prstGeom>
-            <a:gradFill flip="none" rotWithShape="1">
-              <a:gsLst>
-                <a:gs pos="0">
-                  <a:schemeClr val="accent5">
-                    <a:lumMod val="5000"/>
-                    <a:lumOff val="95000"/>
-                  </a:schemeClr>
-                </a:gs>
-                <a:gs pos="74000">
-                  <a:schemeClr val="accent5">
-                    <a:lumMod val="45000"/>
-                    <a:lumOff val="55000"/>
-                  </a:schemeClr>
-                </a:gs>
-                <a:gs pos="83000">
-                  <a:schemeClr val="accent5">
-                    <a:lumMod val="45000"/>
-                    <a:lumOff val="55000"/>
-                  </a:schemeClr>
-                </a:gs>
-                <a:gs pos="100000">
-                  <a:schemeClr val="accent5">
-                    <a:lumMod val="30000"/>
-                    <a:lumOff val="70000"/>
-                  </a:schemeClr>
-                </a:gs>
-              </a:gsLst>
-              <a:lin ang="5400000" scaled="1"/>
-              <a:tileRect/>
-            </a:gradFill>
-          </p:spPr>
-          <p:style>
-            <a:lnRef idx="2">
-              <a:schemeClr val="accent1">
-                <a:shade val="50000"/>
-              </a:schemeClr>
-            </a:lnRef>
-            <a:fillRef idx="1">
-              <a:schemeClr val="accent1"/>
-            </a:fillRef>
-            <a:effectRef idx="0">
-              <a:schemeClr val="accent1"/>
-            </a:effectRef>
-            <a:fontRef idx="minor">
-              <a:schemeClr val="lt1"/>
-            </a:fontRef>
-          </p:style>
-          <p:txBody>
-            <a:bodyPr rtlCol="0" anchor="ctr"/>
-            <a:lstStyle/>
-            <a:p>
-              <a:pPr algn="ctr"/>
-              <a:r>
-                <a:rPr lang="en-US" dirty="0">
-                  <a:solidFill>
-                    <a:schemeClr val="tx1"/>
-                  </a:solidFill>
-                </a:rPr>
-                <a:t>D1</a:t>
-              </a:r>
-            </a:p>
-          </p:txBody>
-        </p:sp>
-        <p:sp>
-          <p:nvSpPr>
-            <p:cNvPr id="13" name="TextBox 12">
-              <a:extLst>
-                <a:ext uri="{FF2B5EF4-FFF2-40B4-BE49-F238E27FC236}">
-                  <a16:creationId xmlns:a16="http://schemas.microsoft.com/office/drawing/2014/main" id="{0DEDBA2C-7A2B-1947-B842-04FB8C4FA973}"/>
-                </a:ext>
-              </a:extLst>
-            </p:cNvPr>
-            <p:cNvSpPr txBox="1"/>
-            <p:nvPr/>
-          </p:nvSpPr>
-          <p:spPr>
-            <a:xfrm>
-              <a:off x="1842388" y="952581"/>
-              <a:ext cx="816249" cy="369332"/>
-            </a:xfrm>
-            <a:prstGeom prst="rect">
-              <a:avLst/>
-            </a:prstGeom>
-            <a:noFill/>
-          </p:spPr>
-          <p:txBody>
-            <a:bodyPr wrap="none" rtlCol="0">
-              <a:spAutoFit/>
-            </a:bodyPr>
-            <a:lstStyle/>
-            <a:p>
-              <a:r>
-                <a:rPr lang="en-US" dirty="0"/>
-                <a:t>Rank 0</a:t>
-              </a:r>
-            </a:p>
-          </p:txBody>
-        </p:sp>
-        <p:sp>
-          <p:nvSpPr>
-            <p:cNvPr id="14" name="TextBox 13">
-              <a:extLst>
-                <a:ext uri="{FF2B5EF4-FFF2-40B4-BE49-F238E27FC236}">
-                  <a16:creationId xmlns:a16="http://schemas.microsoft.com/office/drawing/2014/main" id="{DE4770D9-8ADF-EE47-A021-5D23A31E9607}"/>
-                </a:ext>
-              </a:extLst>
-            </p:cNvPr>
-            <p:cNvSpPr txBox="1"/>
-            <p:nvPr/>
-          </p:nvSpPr>
-          <p:spPr>
-            <a:xfrm>
-              <a:off x="1842388" y="2276123"/>
-              <a:ext cx="816249" cy="369332"/>
-            </a:xfrm>
-            <a:prstGeom prst="rect">
-              <a:avLst/>
-            </a:prstGeom>
-            <a:noFill/>
-          </p:spPr>
-          <p:txBody>
-            <a:bodyPr wrap="none" rtlCol="0">
-              <a:spAutoFit/>
-            </a:bodyPr>
-            <a:lstStyle/>
-            <a:p>
-              <a:r>
-                <a:rPr lang="en-US" dirty="0"/>
-                <a:t>Rank 1</a:t>
-              </a:r>
-            </a:p>
-          </p:txBody>
-        </p:sp>
-        <p:sp>
-          <p:nvSpPr>
-            <p:cNvPr id="15" name="TextBox 14">
-              <a:extLst>
-                <a:ext uri="{FF2B5EF4-FFF2-40B4-BE49-F238E27FC236}">
-                  <a16:creationId xmlns:a16="http://schemas.microsoft.com/office/drawing/2014/main" id="{31B118A3-1571-7145-BCD2-86F033D2D7D7}"/>
-                </a:ext>
-              </a:extLst>
-            </p:cNvPr>
-            <p:cNvSpPr txBox="1"/>
-            <p:nvPr/>
-          </p:nvSpPr>
-          <p:spPr>
-            <a:xfrm>
-              <a:off x="1842388" y="3044147"/>
-              <a:ext cx="816249" cy="369332"/>
-            </a:xfrm>
-            <a:prstGeom prst="rect">
-              <a:avLst/>
-            </a:prstGeom>
-            <a:noFill/>
-          </p:spPr>
-          <p:txBody>
-            <a:bodyPr wrap="none" rtlCol="0">
-              <a:spAutoFit/>
-            </a:bodyPr>
-            <a:lstStyle/>
-            <a:p>
-              <a:r>
-                <a:rPr lang="en-US" dirty="0"/>
-                <a:t>Rank 2</a:t>
-              </a:r>
-            </a:p>
-          </p:txBody>
-        </p:sp>
-        <p:sp>
-          <p:nvSpPr>
-            <p:cNvPr id="17" name="TextBox 16">
-              <a:extLst>
-                <a:ext uri="{FF2B5EF4-FFF2-40B4-BE49-F238E27FC236}">
-                  <a16:creationId xmlns:a16="http://schemas.microsoft.com/office/drawing/2014/main" id="{551D0640-247F-E447-8676-EEC9BDCEE0EF}"/>
-                </a:ext>
-              </a:extLst>
-            </p:cNvPr>
-            <p:cNvSpPr txBox="1"/>
-            <p:nvPr/>
-          </p:nvSpPr>
-          <p:spPr>
-            <a:xfrm>
-              <a:off x="1842388" y="3813853"/>
-              <a:ext cx="816249" cy="369332"/>
-            </a:xfrm>
-            <a:prstGeom prst="rect">
-              <a:avLst/>
-            </a:prstGeom>
-            <a:noFill/>
-          </p:spPr>
-          <p:txBody>
-            <a:bodyPr wrap="none" rtlCol="0">
-              <a:spAutoFit/>
-            </a:bodyPr>
-            <a:lstStyle/>
-            <a:p>
-              <a:r>
-                <a:rPr lang="en-US" dirty="0"/>
-                <a:t>Rank 3</a:t>
-              </a:r>
-            </a:p>
-          </p:txBody>
-        </p:sp>
-        <p:sp>
-          <p:nvSpPr>
-            <p:cNvPr id="18" name="TextBox 17">
-              <a:extLst>
-                <a:ext uri="{FF2B5EF4-FFF2-40B4-BE49-F238E27FC236}">
-                  <a16:creationId xmlns:a16="http://schemas.microsoft.com/office/drawing/2014/main" id="{3E341B3A-FB70-AD42-AFFB-89BF2E93798B}"/>
-                </a:ext>
-              </a:extLst>
-            </p:cNvPr>
-            <p:cNvSpPr txBox="1"/>
-            <p:nvPr/>
-          </p:nvSpPr>
-          <p:spPr>
-            <a:xfrm>
-              <a:off x="1844330" y="4582718"/>
-              <a:ext cx="816249" cy="369332"/>
-            </a:xfrm>
-            <a:prstGeom prst="rect">
-              <a:avLst/>
-            </a:prstGeom>
-            <a:noFill/>
-          </p:spPr>
-          <p:txBody>
-            <a:bodyPr wrap="none" rtlCol="0">
-              <a:spAutoFit/>
-            </a:bodyPr>
-            <a:lstStyle/>
-            <a:p>
-              <a:r>
-                <a:rPr lang="en-US" dirty="0"/>
-                <a:t>Rank 4</a:t>
-              </a:r>
-            </a:p>
-          </p:txBody>
-        </p:sp>
-        <p:cxnSp>
-          <p:nvCxnSpPr>
-            <p:cNvPr id="20" name="Elbow Connector 19">
-              <a:extLst>
-                <a:ext uri="{FF2B5EF4-FFF2-40B4-BE49-F238E27FC236}">
-                  <a16:creationId xmlns:a16="http://schemas.microsoft.com/office/drawing/2014/main" id="{3F530081-CD8F-A940-8DC9-B37605D28486}"/>
-                </a:ext>
-              </a:extLst>
-            </p:cNvPr>
-            <p:cNvCxnSpPr>
-              <a:stCxn id="4" idx="2"/>
-              <a:endCxn id="8" idx="3"/>
-            </p:cNvCxnSpPr>
-            <p:nvPr/>
-          </p:nvCxnSpPr>
-          <p:spPr>
-            <a:xfrm rot="5400000">
-              <a:off x="3382083" y="1670674"/>
-              <a:ext cx="1031484" cy="548748"/>
-            </a:xfrm>
-            <a:prstGeom prst="bentConnector2">
-              <a:avLst/>
-            </a:prstGeom>
-            <a:ln w="25400">
-              <a:tailEnd type="triangle"/>
-            </a:ln>
-          </p:spPr>
-          <p:style>
-            <a:lnRef idx="1">
-              <a:schemeClr val="accent1"/>
-            </a:lnRef>
-            <a:fillRef idx="0">
-              <a:schemeClr val="accent1"/>
-            </a:fillRef>
-            <a:effectRef idx="0">
-              <a:schemeClr val="accent1"/>
-            </a:effectRef>
-            <a:fontRef idx="minor">
-              <a:schemeClr val="tx1"/>
-            </a:fontRef>
-          </p:style>
-        </p:cxnSp>
-        <p:cxnSp>
-          <p:nvCxnSpPr>
-            <p:cNvPr id="21" name="Elbow Connector 20">
-              <a:extLst>
-                <a:ext uri="{FF2B5EF4-FFF2-40B4-BE49-F238E27FC236}">
-                  <a16:creationId xmlns:a16="http://schemas.microsoft.com/office/drawing/2014/main" id="{F3178403-84E6-B44F-9214-E569082EDC1D}"/>
-                </a:ext>
-              </a:extLst>
-            </p:cNvPr>
-            <p:cNvCxnSpPr>
-              <a:cxnSpLocks/>
-              <a:stCxn id="5" idx="2"/>
-              <a:endCxn id="12" idx="3"/>
-            </p:cNvCxnSpPr>
-            <p:nvPr/>
-          </p:nvCxnSpPr>
-          <p:spPr>
-            <a:xfrm rot="5400000">
-              <a:off x="3318936" y="1735124"/>
-              <a:ext cx="1800349" cy="1188712"/>
-            </a:xfrm>
-            <a:prstGeom prst="bentConnector2">
-              <a:avLst/>
-            </a:prstGeom>
-            <a:ln w="25400">
-              <a:tailEnd type="triangle"/>
-            </a:ln>
-          </p:spPr>
-          <p:style>
-            <a:lnRef idx="1">
-              <a:schemeClr val="accent1"/>
-            </a:lnRef>
-            <a:fillRef idx="0">
-              <a:schemeClr val="accent1"/>
-            </a:fillRef>
-            <a:effectRef idx="0">
-              <a:schemeClr val="accent1"/>
-            </a:effectRef>
-            <a:fontRef idx="minor">
-              <a:schemeClr val="tx1"/>
-            </a:fontRef>
-          </p:style>
-        </p:cxnSp>
-        <p:cxnSp>
-          <p:nvCxnSpPr>
-            <p:cNvPr id="22" name="Elbow Connector 21">
-              <a:extLst>
-                <a:ext uri="{FF2B5EF4-FFF2-40B4-BE49-F238E27FC236}">
-                  <a16:creationId xmlns:a16="http://schemas.microsoft.com/office/drawing/2014/main" id="{0E4317DC-6F81-E74F-94D8-5696976192FB}"/>
-                </a:ext>
-              </a:extLst>
-            </p:cNvPr>
-            <p:cNvCxnSpPr>
-              <a:cxnSpLocks/>
-              <a:stCxn id="6" idx="2"/>
-              <a:endCxn id="11" idx="3"/>
-            </p:cNvCxnSpPr>
-            <p:nvPr/>
-          </p:nvCxnSpPr>
-          <p:spPr>
-            <a:xfrm rot="5400000">
-              <a:off x="3255136" y="1798923"/>
-              <a:ext cx="2569214" cy="1829980"/>
-            </a:xfrm>
-            <a:prstGeom prst="bentConnector2">
-              <a:avLst/>
-            </a:prstGeom>
-            <a:ln w="25400">
-              <a:tailEnd type="triangle"/>
-            </a:ln>
-          </p:spPr>
-          <p:style>
-            <a:lnRef idx="1">
-              <a:schemeClr val="accent1"/>
-            </a:lnRef>
-            <a:fillRef idx="0">
-              <a:schemeClr val="accent1"/>
-            </a:fillRef>
-            <a:effectRef idx="0">
-              <a:schemeClr val="accent1"/>
-            </a:effectRef>
-            <a:fontRef idx="minor">
-              <a:schemeClr val="tx1"/>
-            </a:fontRef>
-          </p:style>
-        </p:cxnSp>
-        <p:cxnSp>
-          <p:nvCxnSpPr>
-            <p:cNvPr id="23" name="Elbow Connector 22">
-              <a:extLst>
-                <a:ext uri="{FF2B5EF4-FFF2-40B4-BE49-F238E27FC236}">
-                  <a16:creationId xmlns:a16="http://schemas.microsoft.com/office/drawing/2014/main" id="{44632BB6-6AD3-1741-9203-DDBE38617909}"/>
-                </a:ext>
-              </a:extLst>
-            </p:cNvPr>
-            <p:cNvCxnSpPr>
-              <a:cxnSpLocks/>
-              <a:stCxn id="7" idx="2"/>
-              <a:endCxn id="10" idx="3"/>
-            </p:cNvCxnSpPr>
-            <p:nvPr/>
-          </p:nvCxnSpPr>
-          <p:spPr>
-            <a:xfrm rot="5400000">
-              <a:off x="3191337" y="1862721"/>
-              <a:ext cx="3338079" cy="2471248"/>
-            </a:xfrm>
-            <a:prstGeom prst="bentConnector2">
-              <a:avLst/>
-            </a:prstGeom>
-            <a:ln w="25400">
-              <a:tailEnd type="triangle"/>
-            </a:ln>
-          </p:spPr>
-          <p:style>
-            <a:lnRef idx="1">
-              <a:schemeClr val="accent1"/>
-            </a:lnRef>
-            <a:fillRef idx="0">
-              <a:schemeClr val="accent1"/>
-            </a:fillRef>
-            <a:effectRef idx="0">
-              <a:schemeClr val="accent1"/>
-            </a:effectRef>
-            <a:fontRef idx="minor">
-              <a:schemeClr val="tx1"/>
-            </a:fontRef>
-          </p:style>
-        </p:cxnSp>
-      </p:grpSp>
+            <a:off x="3851565" y="788039"/>
+            <a:ext cx="641267" cy="641267"/>
+          </a:xfrm>
+          <a:prstGeom prst="roundRect">
+            <a:avLst/>
+          </a:prstGeom>
+          <a:gradFill flip="none" rotWithShape="1">
+            <a:gsLst>
+              <a:gs pos="0">
+                <a:schemeClr val="accent5">
+                  <a:lumMod val="5000"/>
+                  <a:lumOff val="95000"/>
+                </a:schemeClr>
+              </a:gs>
+              <a:gs pos="74000">
+                <a:schemeClr val="accent5">
+                  <a:lumMod val="45000"/>
+                  <a:lumOff val="55000"/>
+                </a:schemeClr>
+              </a:gs>
+              <a:gs pos="83000">
+                <a:schemeClr val="accent5">
+                  <a:lumMod val="45000"/>
+                  <a:lumOff val="55000"/>
+                </a:schemeClr>
+              </a:gs>
+              <a:gs pos="100000">
+                <a:schemeClr val="accent5">
+                  <a:lumMod val="30000"/>
+                  <a:lumOff val="70000"/>
+                </a:schemeClr>
+              </a:gs>
+            </a:gsLst>
+            <a:lin ang="5400000" scaled="1"/>
+            <a:tileRect/>
+          </a:gradFill>
+        </p:spPr>
+        <p:style>
+          <a:lnRef idx="2">
+            <a:schemeClr val="accent1">
+              <a:shade val="50000"/>
+            </a:schemeClr>
+          </a:lnRef>
+          <a:fillRef idx="1">
+            <a:schemeClr val="accent1"/>
+          </a:fillRef>
+          <a:effectRef idx="0">
+            <a:schemeClr val="accent1"/>
+          </a:effectRef>
+          <a:fontRef idx="minor">
+            <a:schemeClr val="lt1"/>
+          </a:fontRef>
+        </p:style>
+        <p:txBody>
+          <a:bodyPr rtlCol="0" anchor="ctr"/>
+          <a:lstStyle/>
+          <a:p>
+            <a:pPr algn="ctr"/>
+            <a:r>
+              <a:rPr lang="en-US" dirty="0">
+                <a:solidFill>
+                  <a:schemeClr val="tx1"/>
+                </a:solidFill>
+              </a:rPr>
+              <a:t>D0</a:t>
+            </a:r>
+          </a:p>
+        </p:txBody>
+      </p:sp>
+      <p:sp>
+        <p:nvSpPr>
+          <p:cNvPr id="8" name="Rounded Rectangle 7">
+            <a:extLst>
+              <a:ext uri="{FF2B5EF4-FFF2-40B4-BE49-F238E27FC236}">
+                <a16:creationId xmlns:a16="http://schemas.microsoft.com/office/drawing/2014/main" id="{D11A220F-CE94-E04D-B63F-D49E0A1C4B89}"/>
+              </a:ext>
+            </a:extLst>
+          </p:cNvPr>
+          <p:cNvSpPr/>
+          <p:nvPr/>
+        </p:nvSpPr>
+        <p:spPr>
+          <a:xfrm>
+            <a:off x="2982184" y="2140156"/>
+            <a:ext cx="641267" cy="641267"/>
+          </a:xfrm>
+          <a:prstGeom prst="roundRect">
+            <a:avLst/>
+          </a:prstGeom>
+          <a:gradFill flip="none" rotWithShape="1">
+            <a:gsLst>
+              <a:gs pos="0">
+                <a:schemeClr val="accent5">
+                  <a:lumMod val="5000"/>
+                  <a:lumOff val="95000"/>
+                </a:schemeClr>
+              </a:gs>
+              <a:gs pos="74000">
+                <a:schemeClr val="accent5">
+                  <a:lumMod val="45000"/>
+                  <a:lumOff val="55000"/>
+                </a:schemeClr>
+              </a:gs>
+              <a:gs pos="83000">
+                <a:schemeClr val="accent5">
+                  <a:lumMod val="45000"/>
+                  <a:lumOff val="55000"/>
+                </a:schemeClr>
+              </a:gs>
+              <a:gs pos="100000">
+                <a:schemeClr val="accent5">
+                  <a:lumMod val="30000"/>
+                  <a:lumOff val="70000"/>
+                </a:schemeClr>
+              </a:gs>
+            </a:gsLst>
+            <a:lin ang="5400000" scaled="1"/>
+            <a:tileRect/>
+          </a:gradFill>
+        </p:spPr>
+        <p:style>
+          <a:lnRef idx="2">
+            <a:schemeClr val="accent1">
+              <a:shade val="50000"/>
+            </a:schemeClr>
+          </a:lnRef>
+          <a:fillRef idx="1">
+            <a:schemeClr val="accent1"/>
+          </a:fillRef>
+          <a:effectRef idx="0">
+            <a:schemeClr val="accent1"/>
+          </a:effectRef>
+          <a:fontRef idx="minor">
+            <a:schemeClr val="lt1"/>
+          </a:fontRef>
+        </p:style>
+        <p:txBody>
+          <a:bodyPr rtlCol="0" anchor="ctr"/>
+          <a:lstStyle/>
+          <a:p>
+            <a:pPr algn="ctr"/>
+            <a:r>
+              <a:rPr lang="en-US" dirty="0">
+                <a:solidFill>
+                  <a:schemeClr val="tx1"/>
+                </a:solidFill>
+              </a:rPr>
+              <a:t>D0</a:t>
+            </a:r>
+          </a:p>
+        </p:txBody>
+      </p:sp>
+      <p:sp>
+        <p:nvSpPr>
+          <p:cNvPr id="10" name="Rounded Rectangle 9">
+            <a:extLst>
+              <a:ext uri="{FF2B5EF4-FFF2-40B4-BE49-F238E27FC236}">
+                <a16:creationId xmlns:a16="http://schemas.microsoft.com/office/drawing/2014/main" id="{F2DD7FB6-F02B-A644-AAA5-3F6B3ED31FCE}"/>
+              </a:ext>
+            </a:extLst>
+          </p:cNvPr>
+          <p:cNvSpPr/>
+          <p:nvPr/>
+        </p:nvSpPr>
+        <p:spPr>
+          <a:xfrm>
+            <a:off x="2983485" y="4446751"/>
+            <a:ext cx="641267" cy="641267"/>
+          </a:xfrm>
+          <a:prstGeom prst="roundRect">
+            <a:avLst/>
+          </a:prstGeom>
+          <a:gradFill flip="none" rotWithShape="1">
+            <a:gsLst>
+              <a:gs pos="0">
+                <a:schemeClr val="accent5">
+                  <a:lumMod val="5000"/>
+                  <a:lumOff val="95000"/>
+                </a:schemeClr>
+              </a:gs>
+              <a:gs pos="74000">
+                <a:schemeClr val="accent5">
+                  <a:lumMod val="45000"/>
+                  <a:lumOff val="55000"/>
+                </a:schemeClr>
+              </a:gs>
+              <a:gs pos="83000">
+                <a:schemeClr val="accent5">
+                  <a:lumMod val="45000"/>
+                  <a:lumOff val="55000"/>
+                </a:schemeClr>
+              </a:gs>
+              <a:gs pos="100000">
+                <a:schemeClr val="accent5">
+                  <a:lumMod val="30000"/>
+                  <a:lumOff val="70000"/>
+                </a:schemeClr>
+              </a:gs>
+            </a:gsLst>
+            <a:lin ang="5400000" scaled="1"/>
+            <a:tileRect/>
+          </a:gradFill>
+        </p:spPr>
+        <p:style>
+          <a:lnRef idx="2">
+            <a:schemeClr val="accent1">
+              <a:shade val="50000"/>
+            </a:schemeClr>
+          </a:lnRef>
+          <a:fillRef idx="1">
+            <a:schemeClr val="accent1"/>
+          </a:fillRef>
+          <a:effectRef idx="0">
+            <a:schemeClr val="accent1"/>
+          </a:effectRef>
+          <a:fontRef idx="minor">
+            <a:schemeClr val="lt1"/>
+          </a:fontRef>
+        </p:style>
+        <p:txBody>
+          <a:bodyPr rtlCol="0" anchor="ctr"/>
+          <a:lstStyle/>
+          <a:p>
+            <a:pPr algn="ctr"/>
+            <a:r>
+              <a:rPr lang="en-US" dirty="0">
+                <a:solidFill>
+                  <a:schemeClr val="tx1"/>
+                </a:solidFill>
+              </a:rPr>
+              <a:t>D3</a:t>
+            </a:r>
+          </a:p>
+        </p:txBody>
+      </p:sp>
+      <p:sp>
+        <p:nvSpPr>
+          <p:cNvPr id="11" name="Rounded Rectangle 10">
+            <a:extLst>
+              <a:ext uri="{FF2B5EF4-FFF2-40B4-BE49-F238E27FC236}">
+                <a16:creationId xmlns:a16="http://schemas.microsoft.com/office/drawing/2014/main" id="{4C8EE817-3131-6D4D-959D-EB2EE5E57F08}"/>
+              </a:ext>
+            </a:extLst>
+          </p:cNvPr>
+          <p:cNvSpPr/>
+          <p:nvPr/>
+        </p:nvSpPr>
+        <p:spPr>
+          <a:xfrm>
+            <a:off x="2983486" y="3677886"/>
+            <a:ext cx="641267" cy="641267"/>
+          </a:xfrm>
+          <a:prstGeom prst="roundRect">
+            <a:avLst/>
+          </a:prstGeom>
+          <a:gradFill flip="none" rotWithShape="1">
+            <a:gsLst>
+              <a:gs pos="0">
+                <a:schemeClr val="accent5">
+                  <a:lumMod val="5000"/>
+                  <a:lumOff val="95000"/>
+                </a:schemeClr>
+              </a:gs>
+              <a:gs pos="74000">
+                <a:schemeClr val="accent5">
+                  <a:lumMod val="45000"/>
+                  <a:lumOff val="55000"/>
+                </a:schemeClr>
+              </a:gs>
+              <a:gs pos="83000">
+                <a:schemeClr val="accent5">
+                  <a:lumMod val="45000"/>
+                  <a:lumOff val="55000"/>
+                </a:schemeClr>
+              </a:gs>
+              <a:gs pos="100000">
+                <a:schemeClr val="accent5">
+                  <a:lumMod val="30000"/>
+                  <a:lumOff val="70000"/>
+                </a:schemeClr>
+              </a:gs>
+            </a:gsLst>
+            <a:lin ang="5400000" scaled="1"/>
+            <a:tileRect/>
+          </a:gradFill>
+        </p:spPr>
+        <p:style>
+          <a:lnRef idx="2">
+            <a:schemeClr val="accent1">
+              <a:shade val="50000"/>
+            </a:schemeClr>
+          </a:lnRef>
+          <a:fillRef idx="1">
+            <a:schemeClr val="accent1"/>
+          </a:fillRef>
+          <a:effectRef idx="0">
+            <a:schemeClr val="accent1"/>
+          </a:effectRef>
+          <a:fontRef idx="minor">
+            <a:schemeClr val="lt1"/>
+          </a:fontRef>
+        </p:style>
+        <p:txBody>
+          <a:bodyPr rtlCol="0" anchor="ctr"/>
+          <a:lstStyle/>
+          <a:p>
+            <a:pPr algn="ctr"/>
+            <a:r>
+              <a:rPr lang="en-US" dirty="0">
+                <a:solidFill>
+                  <a:schemeClr val="tx1"/>
+                </a:solidFill>
+              </a:rPr>
+              <a:t>D2</a:t>
+            </a:r>
+          </a:p>
+        </p:txBody>
+      </p:sp>
+      <p:sp>
+        <p:nvSpPr>
+          <p:cNvPr id="12" name="Rounded Rectangle 11">
+            <a:extLst>
+              <a:ext uri="{FF2B5EF4-FFF2-40B4-BE49-F238E27FC236}">
+                <a16:creationId xmlns:a16="http://schemas.microsoft.com/office/drawing/2014/main" id="{CBC73F86-3905-F947-96B1-9BC6C1C3EF70}"/>
+              </a:ext>
+            </a:extLst>
+          </p:cNvPr>
+          <p:cNvSpPr/>
+          <p:nvPr/>
+        </p:nvSpPr>
+        <p:spPr>
+          <a:xfrm>
+            <a:off x="2983487" y="2909021"/>
+            <a:ext cx="641267" cy="641267"/>
+          </a:xfrm>
+          <a:prstGeom prst="roundRect">
+            <a:avLst/>
+          </a:prstGeom>
+          <a:gradFill flip="none" rotWithShape="1">
+            <a:gsLst>
+              <a:gs pos="0">
+                <a:schemeClr val="accent5">
+                  <a:lumMod val="5000"/>
+                  <a:lumOff val="95000"/>
+                </a:schemeClr>
+              </a:gs>
+              <a:gs pos="74000">
+                <a:schemeClr val="accent5">
+                  <a:lumMod val="45000"/>
+                  <a:lumOff val="55000"/>
+                </a:schemeClr>
+              </a:gs>
+              <a:gs pos="83000">
+                <a:schemeClr val="accent5">
+                  <a:lumMod val="45000"/>
+                  <a:lumOff val="55000"/>
+                </a:schemeClr>
+              </a:gs>
+              <a:gs pos="100000">
+                <a:schemeClr val="accent5">
+                  <a:lumMod val="30000"/>
+                  <a:lumOff val="70000"/>
+                </a:schemeClr>
+              </a:gs>
+            </a:gsLst>
+            <a:lin ang="5400000" scaled="1"/>
+            <a:tileRect/>
+          </a:gradFill>
+        </p:spPr>
+        <p:style>
+          <a:lnRef idx="2">
+            <a:schemeClr val="accent1">
+              <a:shade val="50000"/>
+            </a:schemeClr>
+          </a:lnRef>
+          <a:fillRef idx="1">
+            <a:schemeClr val="accent1"/>
+          </a:fillRef>
+          <a:effectRef idx="0">
+            <a:schemeClr val="accent1"/>
+          </a:effectRef>
+          <a:fontRef idx="minor">
+            <a:schemeClr val="lt1"/>
+          </a:fontRef>
+        </p:style>
+        <p:txBody>
+          <a:bodyPr rtlCol="0" anchor="ctr"/>
+          <a:lstStyle/>
+          <a:p>
+            <a:pPr algn="ctr"/>
+            <a:r>
+              <a:rPr lang="en-US" dirty="0">
+                <a:solidFill>
+                  <a:schemeClr val="tx1"/>
+                </a:solidFill>
+              </a:rPr>
+              <a:t>D1</a:t>
+            </a:r>
+          </a:p>
+        </p:txBody>
+      </p:sp>
+      <p:sp>
+        <p:nvSpPr>
+          <p:cNvPr id="13" name="TextBox 12">
+            <a:extLst>
+              <a:ext uri="{FF2B5EF4-FFF2-40B4-BE49-F238E27FC236}">
+                <a16:creationId xmlns:a16="http://schemas.microsoft.com/office/drawing/2014/main" id="{0DEDBA2C-7A2B-1947-B842-04FB8C4FA973}"/>
+              </a:ext>
+            </a:extLst>
+          </p:cNvPr>
+          <p:cNvSpPr txBox="1"/>
+          <p:nvPr/>
+        </p:nvSpPr>
+        <p:spPr>
+          <a:xfrm>
+            <a:off x="1842388" y="952581"/>
+            <a:ext cx="816249" cy="369332"/>
+          </a:xfrm>
+          <a:prstGeom prst="rect">
+            <a:avLst/>
+          </a:prstGeom>
+          <a:noFill/>
+        </p:spPr>
+        <p:txBody>
+          <a:bodyPr wrap="none" rtlCol="0">
+            <a:spAutoFit/>
+          </a:bodyPr>
+          <a:lstStyle/>
+          <a:p>
+            <a:r>
+              <a:rPr lang="en-US" dirty="0"/>
+              <a:t>Rank 0</a:t>
+            </a:r>
+          </a:p>
+        </p:txBody>
+      </p:sp>
+      <p:sp>
+        <p:nvSpPr>
+          <p:cNvPr id="14" name="TextBox 13">
+            <a:extLst>
+              <a:ext uri="{FF2B5EF4-FFF2-40B4-BE49-F238E27FC236}">
+                <a16:creationId xmlns:a16="http://schemas.microsoft.com/office/drawing/2014/main" id="{DE4770D9-8ADF-EE47-A021-5D23A31E9607}"/>
+              </a:ext>
+            </a:extLst>
+          </p:cNvPr>
+          <p:cNvSpPr txBox="1"/>
+          <p:nvPr/>
+        </p:nvSpPr>
+        <p:spPr>
+          <a:xfrm>
+            <a:off x="1842388" y="2276123"/>
+            <a:ext cx="816249" cy="369332"/>
+          </a:xfrm>
+          <a:prstGeom prst="rect">
+            <a:avLst/>
+          </a:prstGeom>
+          <a:noFill/>
+        </p:spPr>
+        <p:txBody>
+          <a:bodyPr wrap="none" rtlCol="0">
+            <a:spAutoFit/>
+          </a:bodyPr>
+          <a:lstStyle/>
+          <a:p>
+            <a:r>
+              <a:rPr lang="en-US" dirty="0"/>
+              <a:t>Rank 1</a:t>
+            </a:r>
+          </a:p>
+        </p:txBody>
+      </p:sp>
+      <p:sp>
+        <p:nvSpPr>
+          <p:cNvPr id="15" name="TextBox 14">
+            <a:extLst>
+              <a:ext uri="{FF2B5EF4-FFF2-40B4-BE49-F238E27FC236}">
+                <a16:creationId xmlns:a16="http://schemas.microsoft.com/office/drawing/2014/main" id="{31B118A3-1571-7145-BCD2-86F033D2D7D7}"/>
+              </a:ext>
+            </a:extLst>
+          </p:cNvPr>
+          <p:cNvSpPr txBox="1"/>
+          <p:nvPr/>
+        </p:nvSpPr>
+        <p:spPr>
+          <a:xfrm>
+            <a:off x="1842388" y="3044147"/>
+            <a:ext cx="816249" cy="369332"/>
+          </a:xfrm>
+          <a:prstGeom prst="rect">
+            <a:avLst/>
+          </a:prstGeom>
+          <a:noFill/>
+        </p:spPr>
+        <p:txBody>
+          <a:bodyPr wrap="none" rtlCol="0">
+            <a:spAutoFit/>
+          </a:bodyPr>
+          <a:lstStyle/>
+          <a:p>
+            <a:r>
+              <a:rPr lang="en-US" dirty="0"/>
+              <a:t>Rank 2</a:t>
+            </a:r>
+          </a:p>
+        </p:txBody>
+      </p:sp>
+      <p:sp>
+        <p:nvSpPr>
+          <p:cNvPr id="17" name="TextBox 16">
+            <a:extLst>
+              <a:ext uri="{FF2B5EF4-FFF2-40B4-BE49-F238E27FC236}">
+                <a16:creationId xmlns:a16="http://schemas.microsoft.com/office/drawing/2014/main" id="{551D0640-247F-E447-8676-EEC9BDCEE0EF}"/>
+              </a:ext>
+            </a:extLst>
+          </p:cNvPr>
+          <p:cNvSpPr txBox="1"/>
+          <p:nvPr/>
+        </p:nvSpPr>
+        <p:spPr>
+          <a:xfrm>
+            <a:off x="1842388" y="3813853"/>
+            <a:ext cx="816249" cy="369332"/>
+          </a:xfrm>
+          <a:prstGeom prst="rect">
+            <a:avLst/>
+          </a:prstGeom>
+          <a:noFill/>
+        </p:spPr>
+        <p:txBody>
+          <a:bodyPr wrap="none" rtlCol="0">
+            <a:spAutoFit/>
+          </a:bodyPr>
+          <a:lstStyle/>
+          <a:p>
+            <a:r>
+              <a:rPr lang="en-US" dirty="0"/>
+              <a:t>Rank 3</a:t>
+            </a:r>
+          </a:p>
+        </p:txBody>
+      </p:sp>
+      <p:sp>
+        <p:nvSpPr>
+          <p:cNvPr id="18" name="TextBox 17">
+            <a:extLst>
+              <a:ext uri="{FF2B5EF4-FFF2-40B4-BE49-F238E27FC236}">
+                <a16:creationId xmlns:a16="http://schemas.microsoft.com/office/drawing/2014/main" id="{3E341B3A-FB70-AD42-AFFB-89BF2E93798B}"/>
+              </a:ext>
+            </a:extLst>
+          </p:cNvPr>
+          <p:cNvSpPr txBox="1"/>
+          <p:nvPr/>
+        </p:nvSpPr>
+        <p:spPr>
+          <a:xfrm>
+            <a:off x="1844330" y="4582718"/>
+            <a:ext cx="816249" cy="369332"/>
+          </a:xfrm>
+          <a:prstGeom prst="rect">
+            <a:avLst/>
+          </a:prstGeom>
+          <a:noFill/>
+        </p:spPr>
+        <p:txBody>
+          <a:bodyPr wrap="none" rtlCol="0">
+            <a:spAutoFit/>
+          </a:bodyPr>
+          <a:lstStyle/>
+          <a:p>
+            <a:r>
+              <a:rPr lang="en-US" dirty="0"/>
+              <a:t>Rank 4</a:t>
+            </a:r>
+          </a:p>
+        </p:txBody>
+      </p:sp>
+      <p:cxnSp>
+        <p:nvCxnSpPr>
+          <p:cNvPr id="20" name="Elbow Connector 19">
+            <a:extLst>
+              <a:ext uri="{FF2B5EF4-FFF2-40B4-BE49-F238E27FC236}">
+                <a16:creationId xmlns:a16="http://schemas.microsoft.com/office/drawing/2014/main" id="{3F530081-CD8F-A940-8DC9-B37605D28486}"/>
+              </a:ext>
+            </a:extLst>
+          </p:cNvPr>
+          <p:cNvCxnSpPr>
+            <a:stCxn id="4" idx="2"/>
+            <a:endCxn id="8" idx="3"/>
+          </p:cNvCxnSpPr>
+          <p:nvPr/>
+        </p:nvCxnSpPr>
+        <p:spPr>
+          <a:xfrm rot="5400000">
+            <a:off x="3382083" y="1670674"/>
+            <a:ext cx="1031484" cy="548748"/>
+          </a:xfrm>
+          <a:prstGeom prst="bentConnector2">
+            <a:avLst/>
+          </a:prstGeom>
+          <a:ln w="50800">
+            <a:headEnd type="oval"/>
+            <a:tailEnd type="triangle"/>
+          </a:ln>
+        </p:spPr>
+        <p:style>
+          <a:lnRef idx="1">
+            <a:schemeClr val="accent1"/>
+          </a:lnRef>
+          <a:fillRef idx="0">
+            <a:schemeClr val="accent1"/>
+          </a:fillRef>
+          <a:effectRef idx="0">
+            <a:schemeClr val="accent1"/>
+          </a:effectRef>
+          <a:fontRef idx="minor">
+            <a:schemeClr val="tx1"/>
+          </a:fontRef>
+        </p:style>
+      </p:cxnSp>
+      <p:cxnSp>
+        <p:nvCxnSpPr>
+          <p:cNvPr id="21" name="Elbow Connector 20">
+            <a:extLst>
+              <a:ext uri="{FF2B5EF4-FFF2-40B4-BE49-F238E27FC236}">
+                <a16:creationId xmlns:a16="http://schemas.microsoft.com/office/drawing/2014/main" id="{F3178403-84E6-B44F-9214-E569082EDC1D}"/>
+              </a:ext>
+            </a:extLst>
+          </p:cNvPr>
+          <p:cNvCxnSpPr>
+            <a:cxnSpLocks/>
+            <a:stCxn id="4" idx="2"/>
+            <a:endCxn id="12" idx="3"/>
+          </p:cNvCxnSpPr>
+          <p:nvPr/>
+        </p:nvCxnSpPr>
+        <p:spPr>
+          <a:xfrm rot="5400000">
+            <a:off x="2998303" y="2055758"/>
+            <a:ext cx="1800349" cy="547445"/>
+          </a:xfrm>
+          <a:prstGeom prst="bentConnector2">
+            <a:avLst/>
+          </a:prstGeom>
+          <a:ln w="50800">
+            <a:headEnd type="oval"/>
+            <a:tailEnd type="triangle"/>
+          </a:ln>
+        </p:spPr>
+        <p:style>
+          <a:lnRef idx="1">
+            <a:schemeClr val="accent1"/>
+          </a:lnRef>
+          <a:fillRef idx="0">
+            <a:schemeClr val="accent1"/>
+          </a:fillRef>
+          <a:effectRef idx="0">
+            <a:schemeClr val="accent1"/>
+          </a:effectRef>
+          <a:fontRef idx="minor">
+            <a:schemeClr val="tx1"/>
+          </a:fontRef>
+        </p:style>
+      </p:cxnSp>
+      <p:cxnSp>
+        <p:nvCxnSpPr>
+          <p:cNvPr id="22" name="Elbow Connector 21">
+            <a:extLst>
+              <a:ext uri="{FF2B5EF4-FFF2-40B4-BE49-F238E27FC236}">
+                <a16:creationId xmlns:a16="http://schemas.microsoft.com/office/drawing/2014/main" id="{0E4317DC-6F81-E74F-94D8-5696976192FB}"/>
+              </a:ext>
+            </a:extLst>
+          </p:cNvPr>
+          <p:cNvCxnSpPr>
+            <a:cxnSpLocks/>
+            <a:stCxn id="4" idx="2"/>
+            <a:endCxn id="11" idx="3"/>
+          </p:cNvCxnSpPr>
+          <p:nvPr/>
+        </p:nvCxnSpPr>
+        <p:spPr>
+          <a:xfrm rot="5400000">
+            <a:off x="2613869" y="2440190"/>
+            <a:ext cx="2569214" cy="547446"/>
+          </a:xfrm>
+          <a:prstGeom prst="bentConnector2">
+            <a:avLst/>
+          </a:prstGeom>
+          <a:ln w="50800">
+            <a:headEnd type="oval"/>
+            <a:tailEnd type="triangle"/>
+          </a:ln>
+        </p:spPr>
+        <p:style>
+          <a:lnRef idx="1">
+            <a:schemeClr val="accent1"/>
+          </a:lnRef>
+          <a:fillRef idx="0">
+            <a:schemeClr val="accent1"/>
+          </a:fillRef>
+          <a:effectRef idx="0">
+            <a:schemeClr val="accent1"/>
+          </a:effectRef>
+          <a:fontRef idx="minor">
+            <a:schemeClr val="tx1"/>
+          </a:fontRef>
+        </p:style>
+      </p:cxnSp>
+      <p:cxnSp>
+        <p:nvCxnSpPr>
+          <p:cNvPr id="23" name="Elbow Connector 22">
+            <a:extLst>
+              <a:ext uri="{FF2B5EF4-FFF2-40B4-BE49-F238E27FC236}">
+                <a16:creationId xmlns:a16="http://schemas.microsoft.com/office/drawing/2014/main" id="{44632BB6-6AD3-1741-9203-DDBE38617909}"/>
+              </a:ext>
+            </a:extLst>
+          </p:cNvPr>
+          <p:cNvCxnSpPr>
+            <a:cxnSpLocks/>
+            <a:stCxn id="4" idx="2"/>
+            <a:endCxn id="10" idx="3"/>
+          </p:cNvCxnSpPr>
+          <p:nvPr/>
+        </p:nvCxnSpPr>
+        <p:spPr>
+          <a:xfrm rot="5400000">
+            <a:off x="2229437" y="2824622"/>
+            <a:ext cx="3338079" cy="547447"/>
+          </a:xfrm>
+          <a:prstGeom prst="bentConnector2">
+            <a:avLst/>
+          </a:prstGeom>
+          <a:ln w="50800">
+            <a:headEnd type="oval"/>
+            <a:tailEnd type="triangle"/>
+          </a:ln>
+        </p:spPr>
+        <p:style>
+          <a:lnRef idx="1">
+            <a:schemeClr val="accent1"/>
+          </a:lnRef>
+          <a:fillRef idx="0">
+            <a:schemeClr val="accent1"/>
+          </a:fillRef>
+          <a:effectRef idx="0">
+            <a:schemeClr val="accent1"/>
+          </a:effectRef>
+          <a:fontRef idx="minor">
+            <a:schemeClr val="tx1"/>
+          </a:fontRef>
+        </p:style>
+      </p:cxnSp>
     </p:spTree>
     <p:extLst>
       <p:ext uri="{BB962C8B-B14F-4D97-AF65-F5344CB8AC3E}">
         <p14:creationId xmlns:p14="http://schemas.microsoft.com/office/powerpoint/2010/main" val="232512046"/>
+      </p:ext>
+    </p:extLst>
+  </p:cSld>
+  <p:clrMapOvr>
+    <a:masterClrMapping/>
+  </p:clrMapOvr>
+</p:sld>
+</file>
+
+<file path=ppt/slides/slide2.xml><?xml version="1.0" encoding="utf-8"?>
+<p:sld xmlns:a="http://schemas.openxmlformats.org/drawingml/2006/main" xmlns:r="http://schemas.openxmlformats.org/officeDocument/2006/relationships" xmlns:p="http://schemas.openxmlformats.org/presentationml/2006/main">
+  <p:cSld>
+    <p:spTree>
+      <p:nvGrpSpPr>
+        <p:cNvPr id="1" name=""/>
+        <p:cNvGrpSpPr/>
+        <p:nvPr/>
+      </p:nvGrpSpPr>
+      <p:grpSpPr>
+        <a:xfrm>
+          <a:off x="0" y="0"/>
+          <a:ext cx="0" cy="0"/>
+          <a:chOff x="0" y="0"/>
+          <a:chExt cx="0" cy="0"/>
+        </a:xfrm>
+      </p:grpSpPr>
+      <p:sp>
+        <p:nvSpPr>
+          <p:cNvPr id="4" name="Rounded Rectangle 3">
+            <a:extLst>
+              <a:ext uri="{FF2B5EF4-FFF2-40B4-BE49-F238E27FC236}">
+                <a16:creationId xmlns:a16="http://schemas.microsoft.com/office/drawing/2014/main" id="{8ACB91C4-10F1-B74A-A783-8EAF058E8AA7}"/>
+              </a:ext>
+            </a:extLst>
+          </p:cNvPr>
+          <p:cNvSpPr/>
+          <p:nvPr/>
+        </p:nvSpPr>
+        <p:spPr>
+          <a:xfrm>
+            <a:off x="3851565" y="788039"/>
+            <a:ext cx="641267" cy="641267"/>
+          </a:xfrm>
+          <a:prstGeom prst="roundRect">
+            <a:avLst/>
+          </a:prstGeom>
+          <a:gradFill flip="none" rotWithShape="1">
+            <a:gsLst>
+              <a:gs pos="0">
+                <a:schemeClr val="accent5">
+                  <a:lumMod val="5000"/>
+                  <a:lumOff val="95000"/>
+                </a:schemeClr>
+              </a:gs>
+              <a:gs pos="74000">
+                <a:schemeClr val="accent5">
+                  <a:lumMod val="45000"/>
+                  <a:lumOff val="55000"/>
+                </a:schemeClr>
+              </a:gs>
+              <a:gs pos="83000">
+                <a:schemeClr val="accent5">
+                  <a:lumMod val="45000"/>
+                  <a:lumOff val="55000"/>
+                </a:schemeClr>
+              </a:gs>
+              <a:gs pos="100000">
+                <a:schemeClr val="accent5">
+                  <a:lumMod val="30000"/>
+                  <a:lumOff val="70000"/>
+                </a:schemeClr>
+              </a:gs>
+            </a:gsLst>
+            <a:lin ang="5400000" scaled="1"/>
+            <a:tileRect/>
+          </a:gradFill>
+        </p:spPr>
+        <p:style>
+          <a:lnRef idx="2">
+            <a:schemeClr val="accent1">
+              <a:shade val="50000"/>
+            </a:schemeClr>
+          </a:lnRef>
+          <a:fillRef idx="1">
+            <a:schemeClr val="accent1"/>
+          </a:fillRef>
+          <a:effectRef idx="0">
+            <a:schemeClr val="accent1"/>
+          </a:effectRef>
+          <a:fontRef idx="minor">
+            <a:schemeClr val="lt1"/>
+          </a:fontRef>
+        </p:style>
+        <p:txBody>
+          <a:bodyPr rtlCol="0" anchor="ctr"/>
+          <a:lstStyle/>
+          <a:p>
+            <a:pPr algn="ctr"/>
+            <a:r>
+              <a:rPr lang="en-US" dirty="0">
+                <a:solidFill>
+                  <a:schemeClr val="tx1"/>
+                </a:solidFill>
+              </a:rPr>
+              <a:t>D0</a:t>
+            </a:r>
+          </a:p>
+        </p:txBody>
+      </p:sp>
+      <p:sp>
+        <p:nvSpPr>
+          <p:cNvPr id="5" name="Rounded Rectangle 4">
+            <a:extLst>
+              <a:ext uri="{FF2B5EF4-FFF2-40B4-BE49-F238E27FC236}">
+                <a16:creationId xmlns:a16="http://schemas.microsoft.com/office/drawing/2014/main" id="{AE5C9134-3A3F-1C4E-82C9-B9EF0BF9D813}"/>
+              </a:ext>
+            </a:extLst>
+          </p:cNvPr>
+          <p:cNvSpPr/>
+          <p:nvPr/>
+        </p:nvSpPr>
+        <p:spPr>
+          <a:xfrm>
+            <a:off x="4492832" y="788039"/>
+            <a:ext cx="641267" cy="641267"/>
+          </a:xfrm>
+          <a:prstGeom prst="roundRect">
+            <a:avLst/>
+          </a:prstGeom>
+          <a:gradFill flip="none" rotWithShape="1">
+            <a:gsLst>
+              <a:gs pos="0">
+                <a:schemeClr val="accent5">
+                  <a:lumMod val="5000"/>
+                  <a:lumOff val="95000"/>
+                </a:schemeClr>
+              </a:gs>
+              <a:gs pos="74000">
+                <a:schemeClr val="accent5">
+                  <a:lumMod val="45000"/>
+                  <a:lumOff val="55000"/>
+                </a:schemeClr>
+              </a:gs>
+              <a:gs pos="83000">
+                <a:schemeClr val="accent5">
+                  <a:lumMod val="45000"/>
+                  <a:lumOff val="55000"/>
+                </a:schemeClr>
+              </a:gs>
+              <a:gs pos="100000">
+                <a:schemeClr val="accent5">
+                  <a:lumMod val="30000"/>
+                  <a:lumOff val="70000"/>
+                </a:schemeClr>
+              </a:gs>
+            </a:gsLst>
+            <a:lin ang="5400000" scaled="1"/>
+            <a:tileRect/>
+          </a:gradFill>
+        </p:spPr>
+        <p:style>
+          <a:lnRef idx="2">
+            <a:schemeClr val="accent1">
+              <a:shade val="50000"/>
+            </a:schemeClr>
+          </a:lnRef>
+          <a:fillRef idx="1">
+            <a:schemeClr val="accent1"/>
+          </a:fillRef>
+          <a:effectRef idx="0">
+            <a:schemeClr val="accent1"/>
+          </a:effectRef>
+          <a:fontRef idx="minor">
+            <a:schemeClr val="lt1"/>
+          </a:fontRef>
+        </p:style>
+        <p:txBody>
+          <a:bodyPr rtlCol="0" anchor="ctr"/>
+          <a:lstStyle/>
+          <a:p>
+            <a:pPr algn="ctr"/>
+            <a:r>
+              <a:rPr lang="en-US" dirty="0">
+                <a:solidFill>
+                  <a:schemeClr val="tx1"/>
+                </a:solidFill>
+              </a:rPr>
+              <a:t>D1</a:t>
+            </a:r>
+          </a:p>
+        </p:txBody>
+      </p:sp>
+      <p:sp>
+        <p:nvSpPr>
+          <p:cNvPr id="6" name="Rounded Rectangle 5">
+            <a:extLst>
+              <a:ext uri="{FF2B5EF4-FFF2-40B4-BE49-F238E27FC236}">
+                <a16:creationId xmlns:a16="http://schemas.microsoft.com/office/drawing/2014/main" id="{78DBB200-8DE5-B045-997D-B946D9EE0AE8}"/>
+              </a:ext>
+            </a:extLst>
+          </p:cNvPr>
+          <p:cNvSpPr/>
+          <p:nvPr/>
+        </p:nvSpPr>
+        <p:spPr>
+          <a:xfrm>
+            <a:off x="5134099" y="788039"/>
+            <a:ext cx="641267" cy="641267"/>
+          </a:xfrm>
+          <a:prstGeom prst="roundRect">
+            <a:avLst/>
+          </a:prstGeom>
+          <a:gradFill flip="none" rotWithShape="1">
+            <a:gsLst>
+              <a:gs pos="0">
+                <a:schemeClr val="accent5">
+                  <a:lumMod val="5000"/>
+                  <a:lumOff val="95000"/>
+                </a:schemeClr>
+              </a:gs>
+              <a:gs pos="74000">
+                <a:schemeClr val="accent5">
+                  <a:lumMod val="45000"/>
+                  <a:lumOff val="55000"/>
+                </a:schemeClr>
+              </a:gs>
+              <a:gs pos="83000">
+                <a:schemeClr val="accent5">
+                  <a:lumMod val="45000"/>
+                  <a:lumOff val="55000"/>
+                </a:schemeClr>
+              </a:gs>
+              <a:gs pos="100000">
+                <a:schemeClr val="accent5">
+                  <a:lumMod val="30000"/>
+                  <a:lumOff val="70000"/>
+                </a:schemeClr>
+              </a:gs>
+            </a:gsLst>
+            <a:lin ang="5400000" scaled="1"/>
+            <a:tileRect/>
+          </a:gradFill>
+        </p:spPr>
+        <p:style>
+          <a:lnRef idx="2">
+            <a:schemeClr val="accent1">
+              <a:shade val="50000"/>
+            </a:schemeClr>
+          </a:lnRef>
+          <a:fillRef idx="1">
+            <a:schemeClr val="accent1"/>
+          </a:fillRef>
+          <a:effectRef idx="0">
+            <a:schemeClr val="accent1"/>
+          </a:effectRef>
+          <a:fontRef idx="minor">
+            <a:schemeClr val="lt1"/>
+          </a:fontRef>
+        </p:style>
+        <p:txBody>
+          <a:bodyPr rtlCol="0" anchor="ctr"/>
+          <a:lstStyle/>
+          <a:p>
+            <a:pPr algn="ctr"/>
+            <a:r>
+              <a:rPr lang="en-US" dirty="0">
+                <a:solidFill>
+                  <a:schemeClr val="tx1"/>
+                </a:solidFill>
+              </a:rPr>
+              <a:t>D2</a:t>
+            </a:r>
+          </a:p>
+        </p:txBody>
+      </p:sp>
+      <p:sp>
+        <p:nvSpPr>
+          <p:cNvPr id="7" name="Rounded Rectangle 6">
+            <a:extLst>
+              <a:ext uri="{FF2B5EF4-FFF2-40B4-BE49-F238E27FC236}">
+                <a16:creationId xmlns:a16="http://schemas.microsoft.com/office/drawing/2014/main" id="{B3DCAD2F-EE91-9945-9E76-EAA2D17F9B79}"/>
+              </a:ext>
+            </a:extLst>
+          </p:cNvPr>
+          <p:cNvSpPr/>
+          <p:nvPr/>
+        </p:nvSpPr>
+        <p:spPr>
+          <a:xfrm>
+            <a:off x="5775366" y="788039"/>
+            <a:ext cx="641267" cy="641267"/>
+          </a:xfrm>
+          <a:prstGeom prst="roundRect">
+            <a:avLst/>
+          </a:prstGeom>
+          <a:gradFill flip="none" rotWithShape="1">
+            <a:gsLst>
+              <a:gs pos="0">
+                <a:schemeClr val="accent5">
+                  <a:lumMod val="5000"/>
+                  <a:lumOff val="95000"/>
+                </a:schemeClr>
+              </a:gs>
+              <a:gs pos="74000">
+                <a:schemeClr val="accent5">
+                  <a:lumMod val="45000"/>
+                  <a:lumOff val="55000"/>
+                </a:schemeClr>
+              </a:gs>
+              <a:gs pos="83000">
+                <a:schemeClr val="accent5">
+                  <a:lumMod val="45000"/>
+                  <a:lumOff val="55000"/>
+                </a:schemeClr>
+              </a:gs>
+              <a:gs pos="100000">
+                <a:schemeClr val="accent5">
+                  <a:lumMod val="30000"/>
+                  <a:lumOff val="70000"/>
+                </a:schemeClr>
+              </a:gs>
+            </a:gsLst>
+            <a:lin ang="5400000" scaled="1"/>
+            <a:tileRect/>
+          </a:gradFill>
+        </p:spPr>
+        <p:style>
+          <a:lnRef idx="2">
+            <a:schemeClr val="accent1">
+              <a:shade val="50000"/>
+            </a:schemeClr>
+          </a:lnRef>
+          <a:fillRef idx="1">
+            <a:schemeClr val="accent1"/>
+          </a:fillRef>
+          <a:effectRef idx="0">
+            <a:schemeClr val="accent1"/>
+          </a:effectRef>
+          <a:fontRef idx="minor">
+            <a:schemeClr val="lt1"/>
+          </a:fontRef>
+        </p:style>
+        <p:txBody>
+          <a:bodyPr rtlCol="0" anchor="ctr"/>
+          <a:lstStyle/>
+          <a:p>
+            <a:pPr algn="ctr"/>
+            <a:r>
+              <a:rPr lang="en-US" dirty="0">
+                <a:solidFill>
+                  <a:schemeClr val="tx1"/>
+                </a:solidFill>
+              </a:rPr>
+              <a:t>D4</a:t>
+            </a:r>
+          </a:p>
+        </p:txBody>
+      </p:sp>
+      <p:sp>
+        <p:nvSpPr>
+          <p:cNvPr id="8" name="Rounded Rectangle 7">
+            <a:extLst>
+              <a:ext uri="{FF2B5EF4-FFF2-40B4-BE49-F238E27FC236}">
+                <a16:creationId xmlns:a16="http://schemas.microsoft.com/office/drawing/2014/main" id="{D11A220F-CE94-E04D-B63F-D49E0A1C4B89}"/>
+              </a:ext>
+            </a:extLst>
+          </p:cNvPr>
+          <p:cNvSpPr/>
+          <p:nvPr/>
+        </p:nvSpPr>
+        <p:spPr>
+          <a:xfrm>
+            <a:off x="2982184" y="2140156"/>
+            <a:ext cx="641267" cy="641267"/>
+          </a:xfrm>
+          <a:prstGeom prst="roundRect">
+            <a:avLst/>
+          </a:prstGeom>
+          <a:gradFill flip="none" rotWithShape="1">
+            <a:gsLst>
+              <a:gs pos="0">
+                <a:schemeClr val="accent5">
+                  <a:lumMod val="5000"/>
+                  <a:lumOff val="95000"/>
+                </a:schemeClr>
+              </a:gs>
+              <a:gs pos="74000">
+                <a:schemeClr val="accent5">
+                  <a:lumMod val="45000"/>
+                  <a:lumOff val="55000"/>
+                </a:schemeClr>
+              </a:gs>
+              <a:gs pos="83000">
+                <a:schemeClr val="accent5">
+                  <a:lumMod val="45000"/>
+                  <a:lumOff val="55000"/>
+                </a:schemeClr>
+              </a:gs>
+              <a:gs pos="100000">
+                <a:schemeClr val="accent5">
+                  <a:lumMod val="30000"/>
+                  <a:lumOff val="70000"/>
+                </a:schemeClr>
+              </a:gs>
+            </a:gsLst>
+            <a:lin ang="5400000" scaled="1"/>
+            <a:tileRect/>
+          </a:gradFill>
+        </p:spPr>
+        <p:style>
+          <a:lnRef idx="2">
+            <a:schemeClr val="accent1">
+              <a:shade val="50000"/>
+            </a:schemeClr>
+          </a:lnRef>
+          <a:fillRef idx="1">
+            <a:schemeClr val="accent1"/>
+          </a:fillRef>
+          <a:effectRef idx="0">
+            <a:schemeClr val="accent1"/>
+          </a:effectRef>
+          <a:fontRef idx="minor">
+            <a:schemeClr val="lt1"/>
+          </a:fontRef>
+        </p:style>
+        <p:txBody>
+          <a:bodyPr rtlCol="0" anchor="ctr"/>
+          <a:lstStyle/>
+          <a:p>
+            <a:pPr algn="ctr"/>
+            <a:r>
+              <a:rPr lang="en-US" dirty="0">
+                <a:solidFill>
+                  <a:schemeClr val="tx1"/>
+                </a:solidFill>
+              </a:rPr>
+              <a:t>D0</a:t>
+            </a:r>
+          </a:p>
+        </p:txBody>
+      </p:sp>
+      <p:sp>
+        <p:nvSpPr>
+          <p:cNvPr id="10" name="Rounded Rectangle 9">
+            <a:extLst>
+              <a:ext uri="{FF2B5EF4-FFF2-40B4-BE49-F238E27FC236}">
+                <a16:creationId xmlns:a16="http://schemas.microsoft.com/office/drawing/2014/main" id="{F2DD7FB6-F02B-A644-AAA5-3F6B3ED31FCE}"/>
+              </a:ext>
+            </a:extLst>
+          </p:cNvPr>
+          <p:cNvSpPr/>
+          <p:nvPr/>
+        </p:nvSpPr>
+        <p:spPr>
+          <a:xfrm>
+            <a:off x="2983485" y="4446751"/>
+            <a:ext cx="641267" cy="641267"/>
+          </a:xfrm>
+          <a:prstGeom prst="roundRect">
+            <a:avLst/>
+          </a:prstGeom>
+          <a:gradFill flip="none" rotWithShape="1">
+            <a:gsLst>
+              <a:gs pos="0">
+                <a:schemeClr val="accent5">
+                  <a:lumMod val="5000"/>
+                  <a:lumOff val="95000"/>
+                </a:schemeClr>
+              </a:gs>
+              <a:gs pos="74000">
+                <a:schemeClr val="accent5">
+                  <a:lumMod val="45000"/>
+                  <a:lumOff val="55000"/>
+                </a:schemeClr>
+              </a:gs>
+              <a:gs pos="83000">
+                <a:schemeClr val="accent5">
+                  <a:lumMod val="45000"/>
+                  <a:lumOff val="55000"/>
+                </a:schemeClr>
+              </a:gs>
+              <a:gs pos="100000">
+                <a:schemeClr val="accent5">
+                  <a:lumMod val="30000"/>
+                  <a:lumOff val="70000"/>
+                </a:schemeClr>
+              </a:gs>
+            </a:gsLst>
+            <a:lin ang="5400000" scaled="1"/>
+            <a:tileRect/>
+          </a:gradFill>
+        </p:spPr>
+        <p:style>
+          <a:lnRef idx="2">
+            <a:schemeClr val="accent1">
+              <a:shade val="50000"/>
+            </a:schemeClr>
+          </a:lnRef>
+          <a:fillRef idx="1">
+            <a:schemeClr val="accent1"/>
+          </a:fillRef>
+          <a:effectRef idx="0">
+            <a:schemeClr val="accent1"/>
+          </a:effectRef>
+          <a:fontRef idx="minor">
+            <a:schemeClr val="lt1"/>
+          </a:fontRef>
+        </p:style>
+        <p:txBody>
+          <a:bodyPr rtlCol="0" anchor="ctr"/>
+          <a:lstStyle/>
+          <a:p>
+            <a:pPr algn="ctr"/>
+            <a:r>
+              <a:rPr lang="en-US" dirty="0">
+                <a:solidFill>
+                  <a:schemeClr val="tx1"/>
+                </a:solidFill>
+              </a:rPr>
+              <a:t>D3</a:t>
+            </a:r>
+          </a:p>
+        </p:txBody>
+      </p:sp>
+      <p:sp>
+        <p:nvSpPr>
+          <p:cNvPr id="11" name="Rounded Rectangle 10">
+            <a:extLst>
+              <a:ext uri="{FF2B5EF4-FFF2-40B4-BE49-F238E27FC236}">
+                <a16:creationId xmlns:a16="http://schemas.microsoft.com/office/drawing/2014/main" id="{4C8EE817-3131-6D4D-959D-EB2EE5E57F08}"/>
+              </a:ext>
+            </a:extLst>
+          </p:cNvPr>
+          <p:cNvSpPr/>
+          <p:nvPr/>
+        </p:nvSpPr>
+        <p:spPr>
+          <a:xfrm>
+            <a:off x="2983486" y="3677886"/>
+            <a:ext cx="641267" cy="641267"/>
+          </a:xfrm>
+          <a:prstGeom prst="roundRect">
+            <a:avLst/>
+          </a:prstGeom>
+          <a:gradFill flip="none" rotWithShape="1">
+            <a:gsLst>
+              <a:gs pos="0">
+                <a:schemeClr val="accent5">
+                  <a:lumMod val="5000"/>
+                  <a:lumOff val="95000"/>
+                </a:schemeClr>
+              </a:gs>
+              <a:gs pos="74000">
+                <a:schemeClr val="accent5">
+                  <a:lumMod val="45000"/>
+                  <a:lumOff val="55000"/>
+                </a:schemeClr>
+              </a:gs>
+              <a:gs pos="83000">
+                <a:schemeClr val="accent5">
+                  <a:lumMod val="45000"/>
+                  <a:lumOff val="55000"/>
+                </a:schemeClr>
+              </a:gs>
+              <a:gs pos="100000">
+                <a:schemeClr val="accent5">
+                  <a:lumMod val="30000"/>
+                  <a:lumOff val="70000"/>
+                </a:schemeClr>
+              </a:gs>
+            </a:gsLst>
+            <a:lin ang="5400000" scaled="1"/>
+            <a:tileRect/>
+          </a:gradFill>
+        </p:spPr>
+        <p:style>
+          <a:lnRef idx="2">
+            <a:schemeClr val="accent1">
+              <a:shade val="50000"/>
+            </a:schemeClr>
+          </a:lnRef>
+          <a:fillRef idx="1">
+            <a:schemeClr val="accent1"/>
+          </a:fillRef>
+          <a:effectRef idx="0">
+            <a:schemeClr val="accent1"/>
+          </a:effectRef>
+          <a:fontRef idx="minor">
+            <a:schemeClr val="lt1"/>
+          </a:fontRef>
+        </p:style>
+        <p:txBody>
+          <a:bodyPr rtlCol="0" anchor="ctr"/>
+          <a:lstStyle/>
+          <a:p>
+            <a:pPr algn="ctr"/>
+            <a:r>
+              <a:rPr lang="en-US" dirty="0">
+                <a:solidFill>
+                  <a:schemeClr val="tx1"/>
+                </a:solidFill>
+              </a:rPr>
+              <a:t>D2</a:t>
+            </a:r>
+          </a:p>
+        </p:txBody>
+      </p:sp>
+      <p:sp>
+        <p:nvSpPr>
+          <p:cNvPr id="12" name="Rounded Rectangle 11">
+            <a:extLst>
+              <a:ext uri="{FF2B5EF4-FFF2-40B4-BE49-F238E27FC236}">
+                <a16:creationId xmlns:a16="http://schemas.microsoft.com/office/drawing/2014/main" id="{CBC73F86-3905-F947-96B1-9BC6C1C3EF70}"/>
+              </a:ext>
+            </a:extLst>
+          </p:cNvPr>
+          <p:cNvSpPr/>
+          <p:nvPr/>
+        </p:nvSpPr>
+        <p:spPr>
+          <a:xfrm>
+            <a:off x="2983487" y="2909021"/>
+            <a:ext cx="641267" cy="641267"/>
+          </a:xfrm>
+          <a:prstGeom prst="roundRect">
+            <a:avLst/>
+          </a:prstGeom>
+          <a:gradFill flip="none" rotWithShape="1">
+            <a:gsLst>
+              <a:gs pos="0">
+                <a:schemeClr val="accent5">
+                  <a:lumMod val="5000"/>
+                  <a:lumOff val="95000"/>
+                </a:schemeClr>
+              </a:gs>
+              <a:gs pos="74000">
+                <a:schemeClr val="accent5">
+                  <a:lumMod val="45000"/>
+                  <a:lumOff val="55000"/>
+                </a:schemeClr>
+              </a:gs>
+              <a:gs pos="83000">
+                <a:schemeClr val="accent5">
+                  <a:lumMod val="45000"/>
+                  <a:lumOff val="55000"/>
+                </a:schemeClr>
+              </a:gs>
+              <a:gs pos="100000">
+                <a:schemeClr val="accent5">
+                  <a:lumMod val="30000"/>
+                  <a:lumOff val="70000"/>
+                </a:schemeClr>
+              </a:gs>
+            </a:gsLst>
+            <a:lin ang="5400000" scaled="1"/>
+            <a:tileRect/>
+          </a:gradFill>
+        </p:spPr>
+        <p:style>
+          <a:lnRef idx="2">
+            <a:schemeClr val="accent1">
+              <a:shade val="50000"/>
+            </a:schemeClr>
+          </a:lnRef>
+          <a:fillRef idx="1">
+            <a:schemeClr val="accent1"/>
+          </a:fillRef>
+          <a:effectRef idx="0">
+            <a:schemeClr val="accent1"/>
+          </a:effectRef>
+          <a:fontRef idx="minor">
+            <a:schemeClr val="lt1"/>
+          </a:fontRef>
+        </p:style>
+        <p:txBody>
+          <a:bodyPr rtlCol="0" anchor="ctr"/>
+          <a:lstStyle/>
+          <a:p>
+            <a:pPr algn="ctr"/>
+            <a:r>
+              <a:rPr lang="en-US" dirty="0">
+                <a:solidFill>
+                  <a:schemeClr val="tx1"/>
+                </a:solidFill>
+              </a:rPr>
+              <a:t>D1</a:t>
+            </a:r>
+          </a:p>
+        </p:txBody>
+      </p:sp>
+      <p:sp>
+        <p:nvSpPr>
+          <p:cNvPr id="13" name="TextBox 12">
+            <a:extLst>
+              <a:ext uri="{FF2B5EF4-FFF2-40B4-BE49-F238E27FC236}">
+                <a16:creationId xmlns:a16="http://schemas.microsoft.com/office/drawing/2014/main" id="{0DEDBA2C-7A2B-1947-B842-04FB8C4FA973}"/>
+              </a:ext>
+            </a:extLst>
+          </p:cNvPr>
+          <p:cNvSpPr txBox="1"/>
+          <p:nvPr/>
+        </p:nvSpPr>
+        <p:spPr>
+          <a:xfrm>
+            <a:off x="1842388" y="952581"/>
+            <a:ext cx="816249" cy="369332"/>
+          </a:xfrm>
+          <a:prstGeom prst="rect">
+            <a:avLst/>
+          </a:prstGeom>
+          <a:noFill/>
+        </p:spPr>
+        <p:txBody>
+          <a:bodyPr wrap="none" rtlCol="0">
+            <a:spAutoFit/>
+          </a:bodyPr>
+          <a:lstStyle/>
+          <a:p>
+            <a:r>
+              <a:rPr lang="en-US" dirty="0"/>
+              <a:t>Rank 0</a:t>
+            </a:r>
+          </a:p>
+        </p:txBody>
+      </p:sp>
+      <p:sp>
+        <p:nvSpPr>
+          <p:cNvPr id="14" name="TextBox 13">
+            <a:extLst>
+              <a:ext uri="{FF2B5EF4-FFF2-40B4-BE49-F238E27FC236}">
+                <a16:creationId xmlns:a16="http://schemas.microsoft.com/office/drawing/2014/main" id="{DE4770D9-8ADF-EE47-A021-5D23A31E9607}"/>
+              </a:ext>
+            </a:extLst>
+          </p:cNvPr>
+          <p:cNvSpPr txBox="1"/>
+          <p:nvPr/>
+        </p:nvSpPr>
+        <p:spPr>
+          <a:xfrm>
+            <a:off x="1842388" y="2276123"/>
+            <a:ext cx="816249" cy="369332"/>
+          </a:xfrm>
+          <a:prstGeom prst="rect">
+            <a:avLst/>
+          </a:prstGeom>
+          <a:noFill/>
+        </p:spPr>
+        <p:txBody>
+          <a:bodyPr wrap="none" rtlCol="0">
+            <a:spAutoFit/>
+          </a:bodyPr>
+          <a:lstStyle/>
+          <a:p>
+            <a:r>
+              <a:rPr lang="en-US" dirty="0"/>
+              <a:t>Rank 1</a:t>
+            </a:r>
+          </a:p>
+        </p:txBody>
+      </p:sp>
+      <p:sp>
+        <p:nvSpPr>
+          <p:cNvPr id="15" name="TextBox 14">
+            <a:extLst>
+              <a:ext uri="{FF2B5EF4-FFF2-40B4-BE49-F238E27FC236}">
+                <a16:creationId xmlns:a16="http://schemas.microsoft.com/office/drawing/2014/main" id="{31B118A3-1571-7145-BCD2-86F033D2D7D7}"/>
+              </a:ext>
+            </a:extLst>
+          </p:cNvPr>
+          <p:cNvSpPr txBox="1"/>
+          <p:nvPr/>
+        </p:nvSpPr>
+        <p:spPr>
+          <a:xfrm>
+            <a:off x="1842388" y="3044147"/>
+            <a:ext cx="816249" cy="369332"/>
+          </a:xfrm>
+          <a:prstGeom prst="rect">
+            <a:avLst/>
+          </a:prstGeom>
+          <a:noFill/>
+        </p:spPr>
+        <p:txBody>
+          <a:bodyPr wrap="none" rtlCol="0">
+            <a:spAutoFit/>
+          </a:bodyPr>
+          <a:lstStyle/>
+          <a:p>
+            <a:r>
+              <a:rPr lang="en-US" dirty="0"/>
+              <a:t>Rank 2</a:t>
+            </a:r>
+          </a:p>
+        </p:txBody>
+      </p:sp>
+      <p:sp>
+        <p:nvSpPr>
+          <p:cNvPr id="17" name="TextBox 16">
+            <a:extLst>
+              <a:ext uri="{FF2B5EF4-FFF2-40B4-BE49-F238E27FC236}">
+                <a16:creationId xmlns:a16="http://schemas.microsoft.com/office/drawing/2014/main" id="{551D0640-247F-E447-8676-EEC9BDCEE0EF}"/>
+              </a:ext>
+            </a:extLst>
+          </p:cNvPr>
+          <p:cNvSpPr txBox="1"/>
+          <p:nvPr/>
+        </p:nvSpPr>
+        <p:spPr>
+          <a:xfrm>
+            <a:off x="1842388" y="3813853"/>
+            <a:ext cx="816249" cy="369332"/>
+          </a:xfrm>
+          <a:prstGeom prst="rect">
+            <a:avLst/>
+          </a:prstGeom>
+          <a:noFill/>
+        </p:spPr>
+        <p:txBody>
+          <a:bodyPr wrap="none" rtlCol="0">
+            <a:spAutoFit/>
+          </a:bodyPr>
+          <a:lstStyle/>
+          <a:p>
+            <a:r>
+              <a:rPr lang="en-US" dirty="0"/>
+              <a:t>Rank 3</a:t>
+            </a:r>
+          </a:p>
+        </p:txBody>
+      </p:sp>
+      <p:sp>
+        <p:nvSpPr>
+          <p:cNvPr id="18" name="TextBox 17">
+            <a:extLst>
+              <a:ext uri="{FF2B5EF4-FFF2-40B4-BE49-F238E27FC236}">
+                <a16:creationId xmlns:a16="http://schemas.microsoft.com/office/drawing/2014/main" id="{3E341B3A-FB70-AD42-AFFB-89BF2E93798B}"/>
+              </a:ext>
+            </a:extLst>
+          </p:cNvPr>
+          <p:cNvSpPr txBox="1"/>
+          <p:nvPr/>
+        </p:nvSpPr>
+        <p:spPr>
+          <a:xfrm>
+            <a:off x="1844330" y="4582718"/>
+            <a:ext cx="816249" cy="369332"/>
+          </a:xfrm>
+          <a:prstGeom prst="rect">
+            <a:avLst/>
+          </a:prstGeom>
+          <a:noFill/>
+        </p:spPr>
+        <p:txBody>
+          <a:bodyPr wrap="none" rtlCol="0">
+            <a:spAutoFit/>
+          </a:bodyPr>
+          <a:lstStyle/>
+          <a:p>
+            <a:r>
+              <a:rPr lang="en-US" dirty="0"/>
+              <a:t>Rank 4</a:t>
+            </a:r>
+          </a:p>
+        </p:txBody>
+      </p:sp>
+      <p:cxnSp>
+        <p:nvCxnSpPr>
+          <p:cNvPr id="20" name="Elbow Connector 19">
+            <a:extLst>
+              <a:ext uri="{FF2B5EF4-FFF2-40B4-BE49-F238E27FC236}">
+                <a16:creationId xmlns:a16="http://schemas.microsoft.com/office/drawing/2014/main" id="{3F530081-CD8F-A940-8DC9-B37605D28486}"/>
+              </a:ext>
+            </a:extLst>
+          </p:cNvPr>
+          <p:cNvCxnSpPr>
+            <a:stCxn id="4" idx="2"/>
+            <a:endCxn id="8" idx="3"/>
+          </p:cNvCxnSpPr>
+          <p:nvPr/>
+        </p:nvCxnSpPr>
+        <p:spPr>
+          <a:xfrm rot="5400000">
+            <a:off x="3382083" y="1670674"/>
+            <a:ext cx="1031484" cy="548748"/>
+          </a:xfrm>
+          <a:prstGeom prst="bentConnector2">
+            <a:avLst/>
+          </a:prstGeom>
+          <a:ln w="50800">
+            <a:headEnd type="oval"/>
+            <a:tailEnd type="triangle"/>
+          </a:ln>
+        </p:spPr>
+        <p:style>
+          <a:lnRef idx="1">
+            <a:schemeClr val="accent1"/>
+          </a:lnRef>
+          <a:fillRef idx="0">
+            <a:schemeClr val="accent1"/>
+          </a:fillRef>
+          <a:effectRef idx="0">
+            <a:schemeClr val="accent1"/>
+          </a:effectRef>
+          <a:fontRef idx="minor">
+            <a:schemeClr val="tx1"/>
+          </a:fontRef>
+        </p:style>
+      </p:cxnSp>
+      <p:cxnSp>
+        <p:nvCxnSpPr>
+          <p:cNvPr id="21" name="Elbow Connector 20">
+            <a:extLst>
+              <a:ext uri="{FF2B5EF4-FFF2-40B4-BE49-F238E27FC236}">
+                <a16:creationId xmlns:a16="http://schemas.microsoft.com/office/drawing/2014/main" id="{F3178403-84E6-B44F-9214-E569082EDC1D}"/>
+              </a:ext>
+            </a:extLst>
+          </p:cNvPr>
+          <p:cNvCxnSpPr>
+            <a:cxnSpLocks/>
+            <a:stCxn id="5" idx="2"/>
+            <a:endCxn id="12" idx="3"/>
+          </p:cNvCxnSpPr>
+          <p:nvPr/>
+        </p:nvCxnSpPr>
+        <p:spPr>
+          <a:xfrm rot="5400000">
+            <a:off x="3318936" y="1735124"/>
+            <a:ext cx="1800349" cy="1188712"/>
+          </a:xfrm>
+          <a:prstGeom prst="bentConnector2">
+            <a:avLst/>
+          </a:prstGeom>
+          <a:ln w="50800">
+            <a:headEnd type="oval"/>
+            <a:tailEnd type="triangle"/>
+          </a:ln>
+        </p:spPr>
+        <p:style>
+          <a:lnRef idx="1">
+            <a:schemeClr val="accent1"/>
+          </a:lnRef>
+          <a:fillRef idx="0">
+            <a:schemeClr val="accent1"/>
+          </a:fillRef>
+          <a:effectRef idx="0">
+            <a:schemeClr val="accent1"/>
+          </a:effectRef>
+          <a:fontRef idx="minor">
+            <a:schemeClr val="tx1"/>
+          </a:fontRef>
+        </p:style>
+      </p:cxnSp>
+      <p:cxnSp>
+        <p:nvCxnSpPr>
+          <p:cNvPr id="22" name="Elbow Connector 21">
+            <a:extLst>
+              <a:ext uri="{FF2B5EF4-FFF2-40B4-BE49-F238E27FC236}">
+                <a16:creationId xmlns:a16="http://schemas.microsoft.com/office/drawing/2014/main" id="{0E4317DC-6F81-E74F-94D8-5696976192FB}"/>
+              </a:ext>
+            </a:extLst>
+          </p:cNvPr>
+          <p:cNvCxnSpPr>
+            <a:cxnSpLocks/>
+            <a:stCxn id="6" idx="2"/>
+            <a:endCxn id="11" idx="3"/>
+          </p:cNvCxnSpPr>
+          <p:nvPr/>
+        </p:nvCxnSpPr>
+        <p:spPr>
+          <a:xfrm rot="5400000">
+            <a:off x="3255136" y="1798923"/>
+            <a:ext cx="2569214" cy="1829980"/>
+          </a:xfrm>
+          <a:prstGeom prst="bentConnector2">
+            <a:avLst/>
+          </a:prstGeom>
+          <a:ln w="50800">
+            <a:headEnd type="oval"/>
+            <a:tailEnd type="triangle"/>
+          </a:ln>
+        </p:spPr>
+        <p:style>
+          <a:lnRef idx="1">
+            <a:schemeClr val="accent1"/>
+          </a:lnRef>
+          <a:fillRef idx="0">
+            <a:schemeClr val="accent1"/>
+          </a:fillRef>
+          <a:effectRef idx="0">
+            <a:schemeClr val="accent1"/>
+          </a:effectRef>
+          <a:fontRef idx="minor">
+            <a:schemeClr val="tx1"/>
+          </a:fontRef>
+        </p:style>
+      </p:cxnSp>
+      <p:cxnSp>
+        <p:nvCxnSpPr>
+          <p:cNvPr id="23" name="Elbow Connector 22">
+            <a:extLst>
+              <a:ext uri="{FF2B5EF4-FFF2-40B4-BE49-F238E27FC236}">
+                <a16:creationId xmlns:a16="http://schemas.microsoft.com/office/drawing/2014/main" id="{44632BB6-6AD3-1741-9203-DDBE38617909}"/>
+              </a:ext>
+            </a:extLst>
+          </p:cNvPr>
+          <p:cNvCxnSpPr>
+            <a:cxnSpLocks/>
+            <a:stCxn id="7" idx="2"/>
+            <a:endCxn id="10" idx="3"/>
+          </p:cNvCxnSpPr>
+          <p:nvPr/>
+        </p:nvCxnSpPr>
+        <p:spPr>
+          <a:xfrm rot="5400000">
+            <a:off x="3191337" y="1862721"/>
+            <a:ext cx="3338079" cy="2471248"/>
+          </a:xfrm>
+          <a:prstGeom prst="bentConnector2">
+            <a:avLst/>
+          </a:prstGeom>
+          <a:ln w="50800">
+            <a:headEnd type="oval"/>
+            <a:tailEnd type="triangle"/>
+          </a:ln>
+        </p:spPr>
+        <p:style>
+          <a:lnRef idx="1">
+            <a:schemeClr val="accent1"/>
+          </a:lnRef>
+          <a:fillRef idx="0">
+            <a:schemeClr val="accent1"/>
+          </a:fillRef>
+          <a:effectRef idx="0">
+            <a:schemeClr val="accent1"/>
+          </a:effectRef>
+          <a:fontRef idx="minor">
+            <a:schemeClr val="tx1"/>
+          </a:fontRef>
+        </p:style>
+      </p:cxnSp>
+    </p:spTree>
+    <p:extLst>
+      <p:ext uri="{BB962C8B-B14F-4D97-AF65-F5344CB8AC3E}">
+        <p14:creationId xmlns:p14="http://schemas.microsoft.com/office/powerpoint/2010/main" val="2593590548"/>
+      </p:ext>
+    </p:extLst>
+  </p:cSld>
+  <p:clrMapOvr>
+    <a:masterClrMapping/>
+  </p:clrMapOvr>
+</p:sld>
+</file>
+
+<file path=ppt/slides/slide3.xml><?xml version="1.0" encoding="utf-8"?>
+<p:sld xmlns:a="http://schemas.openxmlformats.org/drawingml/2006/main" xmlns:r="http://schemas.openxmlformats.org/officeDocument/2006/relationships" xmlns:p="http://schemas.openxmlformats.org/presentationml/2006/main">
+  <p:cSld>
+    <p:spTree>
+      <p:nvGrpSpPr>
+        <p:cNvPr id="1" name=""/>
+        <p:cNvGrpSpPr/>
+        <p:nvPr/>
+      </p:nvGrpSpPr>
+      <p:grpSpPr>
+        <a:xfrm>
+          <a:off x="0" y="0"/>
+          <a:ext cx="0" cy="0"/>
+          <a:chOff x="0" y="0"/>
+          <a:chExt cx="0" cy="0"/>
+        </a:xfrm>
+      </p:grpSpPr>
+      <p:sp>
+        <p:nvSpPr>
+          <p:cNvPr id="4" name="Rounded Rectangle 3">
+            <a:extLst>
+              <a:ext uri="{FF2B5EF4-FFF2-40B4-BE49-F238E27FC236}">
+                <a16:creationId xmlns:a16="http://schemas.microsoft.com/office/drawing/2014/main" id="{8ACB91C4-10F1-B74A-A783-8EAF058E8AA7}"/>
+              </a:ext>
+            </a:extLst>
+          </p:cNvPr>
+          <p:cNvSpPr/>
+          <p:nvPr/>
+        </p:nvSpPr>
+        <p:spPr>
+          <a:xfrm>
+            <a:off x="3851565" y="788039"/>
+            <a:ext cx="641267" cy="641267"/>
+          </a:xfrm>
+          <a:prstGeom prst="roundRect">
+            <a:avLst/>
+          </a:prstGeom>
+          <a:gradFill flip="none" rotWithShape="1">
+            <a:gsLst>
+              <a:gs pos="0">
+                <a:schemeClr val="accent5">
+                  <a:lumMod val="5000"/>
+                  <a:lumOff val="95000"/>
+                </a:schemeClr>
+              </a:gs>
+              <a:gs pos="74000">
+                <a:schemeClr val="accent5">
+                  <a:lumMod val="45000"/>
+                  <a:lumOff val="55000"/>
+                </a:schemeClr>
+              </a:gs>
+              <a:gs pos="83000">
+                <a:schemeClr val="accent5">
+                  <a:lumMod val="45000"/>
+                  <a:lumOff val="55000"/>
+                </a:schemeClr>
+              </a:gs>
+              <a:gs pos="100000">
+                <a:schemeClr val="accent5">
+                  <a:lumMod val="30000"/>
+                  <a:lumOff val="70000"/>
+                </a:schemeClr>
+              </a:gs>
+            </a:gsLst>
+            <a:lin ang="5400000" scaled="1"/>
+            <a:tileRect/>
+          </a:gradFill>
+        </p:spPr>
+        <p:style>
+          <a:lnRef idx="2">
+            <a:schemeClr val="accent1">
+              <a:shade val="50000"/>
+            </a:schemeClr>
+          </a:lnRef>
+          <a:fillRef idx="1">
+            <a:schemeClr val="accent1"/>
+          </a:fillRef>
+          <a:effectRef idx="0">
+            <a:schemeClr val="accent1"/>
+          </a:effectRef>
+          <a:fontRef idx="minor">
+            <a:schemeClr val="lt1"/>
+          </a:fontRef>
+        </p:style>
+        <p:txBody>
+          <a:bodyPr rtlCol="0" anchor="ctr"/>
+          <a:lstStyle/>
+          <a:p>
+            <a:pPr algn="ctr"/>
+            <a:r>
+              <a:rPr lang="en-US" dirty="0">
+                <a:solidFill>
+                  <a:schemeClr val="tx1"/>
+                </a:solidFill>
+              </a:rPr>
+              <a:t>D0</a:t>
+            </a:r>
+          </a:p>
+        </p:txBody>
+      </p:sp>
+      <p:sp>
+        <p:nvSpPr>
+          <p:cNvPr id="5" name="Rounded Rectangle 4">
+            <a:extLst>
+              <a:ext uri="{FF2B5EF4-FFF2-40B4-BE49-F238E27FC236}">
+                <a16:creationId xmlns:a16="http://schemas.microsoft.com/office/drawing/2014/main" id="{AE5C9134-3A3F-1C4E-82C9-B9EF0BF9D813}"/>
+              </a:ext>
+            </a:extLst>
+          </p:cNvPr>
+          <p:cNvSpPr/>
+          <p:nvPr/>
+        </p:nvSpPr>
+        <p:spPr>
+          <a:xfrm>
+            <a:off x="4492832" y="788039"/>
+            <a:ext cx="641267" cy="641267"/>
+          </a:xfrm>
+          <a:prstGeom prst="roundRect">
+            <a:avLst/>
+          </a:prstGeom>
+          <a:gradFill flip="none" rotWithShape="1">
+            <a:gsLst>
+              <a:gs pos="0">
+                <a:schemeClr val="accent5">
+                  <a:lumMod val="5000"/>
+                  <a:lumOff val="95000"/>
+                </a:schemeClr>
+              </a:gs>
+              <a:gs pos="74000">
+                <a:schemeClr val="accent5">
+                  <a:lumMod val="45000"/>
+                  <a:lumOff val="55000"/>
+                </a:schemeClr>
+              </a:gs>
+              <a:gs pos="83000">
+                <a:schemeClr val="accent5">
+                  <a:lumMod val="45000"/>
+                  <a:lumOff val="55000"/>
+                </a:schemeClr>
+              </a:gs>
+              <a:gs pos="100000">
+                <a:schemeClr val="accent5">
+                  <a:lumMod val="30000"/>
+                  <a:lumOff val="70000"/>
+                </a:schemeClr>
+              </a:gs>
+            </a:gsLst>
+            <a:lin ang="5400000" scaled="1"/>
+            <a:tileRect/>
+          </a:gradFill>
+        </p:spPr>
+        <p:style>
+          <a:lnRef idx="2">
+            <a:schemeClr val="accent1">
+              <a:shade val="50000"/>
+            </a:schemeClr>
+          </a:lnRef>
+          <a:fillRef idx="1">
+            <a:schemeClr val="accent1"/>
+          </a:fillRef>
+          <a:effectRef idx="0">
+            <a:schemeClr val="accent1"/>
+          </a:effectRef>
+          <a:fontRef idx="minor">
+            <a:schemeClr val="lt1"/>
+          </a:fontRef>
+        </p:style>
+        <p:txBody>
+          <a:bodyPr rtlCol="0" anchor="ctr"/>
+          <a:lstStyle/>
+          <a:p>
+            <a:pPr algn="ctr"/>
+            <a:r>
+              <a:rPr lang="en-US" dirty="0">
+                <a:solidFill>
+                  <a:schemeClr val="tx1"/>
+                </a:solidFill>
+              </a:rPr>
+              <a:t>D1</a:t>
+            </a:r>
+          </a:p>
+        </p:txBody>
+      </p:sp>
+      <p:sp>
+        <p:nvSpPr>
+          <p:cNvPr id="6" name="Rounded Rectangle 5">
+            <a:extLst>
+              <a:ext uri="{FF2B5EF4-FFF2-40B4-BE49-F238E27FC236}">
+                <a16:creationId xmlns:a16="http://schemas.microsoft.com/office/drawing/2014/main" id="{78DBB200-8DE5-B045-997D-B946D9EE0AE8}"/>
+              </a:ext>
+            </a:extLst>
+          </p:cNvPr>
+          <p:cNvSpPr/>
+          <p:nvPr/>
+        </p:nvSpPr>
+        <p:spPr>
+          <a:xfrm>
+            <a:off x="5134099" y="788039"/>
+            <a:ext cx="641267" cy="641267"/>
+          </a:xfrm>
+          <a:prstGeom prst="roundRect">
+            <a:avLst/>
+          </a:prstGeom>
+          <a:gradFill flip="none" rotWithShape="1">
+            <a:gsLst>
+              <a:gs pos="0">
+                <a:schemeClr val="accent5">
+                  <a:lumMod val="5000"/>
+                  <a:lumOff val="95000"/>
+                </a:schemeClr>
+              </a:gs>
+              <a:gs pos="74000">
+                <a:schemeClr val="accent5">
+                  <a:lumMod val="45000"/>
+                  <a:lumOff val="55000"/>
+                </a:schemeClr>
+              </a:gs>
+              <a:gs pos="83000">
+                <a:schemeClr val="accent5">
+                  <a:lumMod val="45000"/>
+                  <a:lumOff val="55000"/>
+                </a:schemeClr>
+              </a:gs>
+              <a:gs pos="100000">
+                <a:schemeClr val="accent5">
+                  <a:lumMod val="30000"/>
+                  <a:lumOff val="70000"/>
+                </a:schemeClr>
+              </a:gs>
+            </a:gsLst>
+            <a:lin ang="5400000" scaled="1"/>
+            <a:tileRect/>
+          </a:gradFill>
+        </p:spPr>
+        <p:style>
+          <a:lnRef idx="2">
+            <a:schemeClr val="accent1">
+              <a:shade val="50000"/>
+            </a:schemeClr>
+          </a:lnRef>
+          <a:fillRef idx="1">
+            <a:schemeClr val="accent1"/>
+          </a:fillRef>
+          <a:effectRef idx="0">
+            <a:schemeClr val="accent1"/>
+          </a:effectRef>
+          <a:fontRef idx="minor">
+            <a:schemeClr val="lt1"/>
+          </a:fontRef>
+        </p:style>
+        <p:txBody>
+          <a:bodyPr rtlCol="0" anchor="ctr"/>
+          <a:lstStyle/>
+          <a:p>
+            <a:pPr algn="ctr"/>
+            <a:r>
+              <a:rPr lang="en-US" dirty="0">
+                <a:solidFill>
+                  <a:schemeClr val="tx1"/>
+                </a:solidFill>
+              </a:rPr>
+              <a:t>D2</a:t>
+            </a:r>
+          </a:p>
+        </p:txBody>
+      </p:sp>
+      <p:sp>
+        <p:nvSpPr>
+          <p:cNvPr id="7" name="Rounded Rectangle 6">
+            <a:extLst>
+              <a:ext uri="{FF2B5EF4-FFF2-40B4-BE49-F238E27FC236}">
+                <a16:creationId xmlns:a16="http://schemas.microsoft.com/office/drawing/2014/main" id="{B3DCAD2F-EE91-9945-9E76-EAA2D17F9B79}"/>
+              </a:ext>
+            </a:extLst>
+          </p:cNvPr>
+          <p:cNvSpPr/>
+          <p:nvPr/>
+        </p:nvSpPr>
+        <p:spPr>
+          <a:xfrm>
+            <a:off x="5775366" y="788039"/>
+            <a:ext cx="641267" cy="641267"/>
+          </a:xfrm>
+          <a:prstGeom prst="roundRect">
+            <a:avLst/>
+          </a:prstGeom>
+          <a:gradFill flip="none" rotWithShape="1">
+            <a:gsLst>
+              <a:gs pos="0">
+                <a:schemeClr val="accent5">
+                  <a:lumMod val="5000"/>
+                  <a:lumOff val="95000"/>
+                </a:schemeClr>
+              </a:gs>
+              <a:gs pos="74000">
+                <a:schemeClr val="accent5">
+                  <a:lumMod val="45000"/>
+                  <a:lumOff val="55000"/>
+                </a:schemeClr>
+              </a:gs>
+              <a:gs pos="83000">
+                <a:schemeClr val="accent5">
+                  <a:lumMod val="45000"/>
+                  <a:lumOff val="55000"/>
+                </a:schemeClr>
+              </a:gs>
+              <a:gs pos="100000">
+                <a:schemeClr val="accent5">
+                  <a:lumMod val="30000"/>
+                  <a:lumOff val="70000"/>
+                </a:schemeClr>
+              </a:gs>
+            </a:gsLst>
+            <a:lin ang="5400000" scaled="1"/>
+            <a:tileRect/>
+          </a:gradFill>
+        </p:spPr>
+        <p:style>
+          <a:lnRef idx="2">
+            <a:schemeClr val="accent1">
+              <a:shade val="50000"/>
+            </a:schemeClr>
+          </a:lnRef>
+          <a:fillRef idx="1">
+            <a:schemeClr val="accent1"/>
+          </a:fillRef>
+          <a:effectRef idx="0">
+            <a:schemeClr val="accent1"/>
+          </a:effectRef>
+          <a:fontRef idx="minor">
+            <a:schemeClr val="lt1"/>
+          </a:fontRef>
+        </p:style>
+        <p:txBody>
+          <a:bodyPr rtlCol="0" anchor="ctr"/>
+          <a:lstStyle/>
+          <a:p>
+            <a:pPr algn="ctr"/>
+            <a:r>
+              <a:rPr lang="en-US" dirty="0">
+                <a:solidFill>
+                  <a:schemeClr val="tx1"/>
+                </a:solidFill>
+              </a:rPr>
+              <a:t>D4</a:t>
+            </a:r>
+          </a:p>
+        </p:txBody>
+      </p:sp>
+      <p:sp>
+        <p:nvSpPr>
+          <p:cNvPr id="8" name="Rounded Rectangle 7">
+            <a:extLst>
+              <a:ext uri="{FF2B5EF4-FFF2-40B4-BE49-F238E27FC236}">
+                <a16:creationId xmlns:a16="http://schemas.microsoft.com/office/drawing/2014/main" id="{D11A220F-CE94-E04D-B63F-D49E0A1C4B89}"/>
+              </a:ext>
+            </a:extLst>
+          </p:cNvPr>
+          <p:cNvSpPr/>
+          <p:nvPr/>
+        </p:nvSpPr>
+        <p:spPr>
+          <a:xfrm>
+            <a:off x="2982184" y="2140156"/>
+            <a:ext cx="641267" cy="641267"/>
+          </a:xfrm>
+          <a:prstGeom prst="roundRect">
+            <a:avLst/>
+          </a:prstGeom>
+          <a:gradFill flip="none" rotWithShape="1">
+            <a:gsLst>
+              <a:gs pos="0">
+                <a:schemeClr val="accent5">
+                  <a:lumMod val="5000"/>
+                  <a:lumOff val="95000"/>
+                </a:schemeClr>
+              </a:gs>
+              <a:gs pos="74000">
+                <a:schemeClr val="accent5">
+                  <a:lumMod val="45000"/>
+                  <a:lumOff val="55000"/>
+                </a:schemeClr>
+              </a:gs>
+              <a:gs pos="83000">
+                <a:schemeClr val="accent5">
+                  <a:lumMod val="45000"/>
+                  <a:lumOff val="55000"/>
+                </a:schemeClr>
+              </a:gs>
+              <a:gs pos="100000">
+                <a:schemeClr val="accent5">
+                  <a:lumMod val="30000"/>
+                  <a:lumOff val="70000"/>
+                </a:schemeClr>
+              </a:gs>
+            </a:gsLst>
+            <a:lin ang="5400000" scaled="1"/>
+            <a:tileRect/>
+          </a:gradFill>
+        </p:spPr>
+        <p:style>
+          <a:lnRef idx="2">
+            <a:schemeClr val="accent1">
+              <a:shade val="50000"/>
+            </a:schemeClr>
+          </a:lnRef>
+          <a:fillRef idx="1">
+            <a:schemeClr val="accent1"/>
+          </a:fillRef>
+          <a:effectRef idx="0">
+            <a:schemeClr val="accent1"/>
+          </a:effectRef>
+          <a:fontRef idx="minor">
+            <a:schemeClr val="lt1"/>
+          </a:fontRef>
+        </p:style>
+        <p:txBody>
+          <a:bodyPr rtlCol="0" anchor="ctr"/>
+          <a:lstStyle/>
+          <a:p>
+            <a:pPr algn="ctr"/>
+            <a:r>
+              <a:rPr lang="en-US" dirty="0">
+                <a:solidFill>
+                  <a:schemeClr val="tx1"/>
+                </a:solidFill>
+              </a:rPr>
+              <a:t>D0</a:t>
+            </a:r>
+          </a:p>
+        </p:txBody>
+      </p:sp>
+      <p:sp>
+        <p:nvSpPr>
+          <p:cNvPr id="10" name="Rounded Rectangle 9">
+            <a:extLst>
+              <a:ext uri="{FF2B5EF4-FFF2-40B4-BE49-F238E27FC236}">
+                <a16:creationId xmlns:a16="http://schemas.microsoft.com/office/drawing/2014/main" id="{F2DD7FB6-F02B-A644-AAA5-3F6B3ED31FCE}"/>
+              </a:ext>
+            </a:extLst>
+          </p:cNvPr>
+          <p:cNvSpPr/>
+          <p:nvPr/>
+        </p:nvSpPr>
+        <p:spPr>
+          <a:xfrm>
+            <a:off x="2983485" y="4446751"/>
+            <a:ext cx="641267" cy="641267"/>
+          </a:xfrm>
+          <a:prstGeom prst="roundRect">
+            <a:avLst/>
+          </a:prstGeom>
+          <a:gradFill flip="none" rotWithShape="1">
+            <a:gsLst>
+              <a:gs pos="0">
+                <a:schemeClr val="accent5">
+                  <a:lumMod val="5000"/>
+                  <a:lumOff val="95000"/>
+                </a:schemeClr>
+              </a:gs>
+              <a:gs pos="74000">
+                <a:schemeClr val="accent5">
+                  <a:lumMod val="45000"/>
+                  <a:lumOff val="55000"/>
+                </a:schemeClr>
+              </a:gs>
+              <a:gs pos="83000">
+                <a:schemeClr val="accent5">
+                  <a:lumMod val="45000"/>
+                  <a:lumOff val="55000"/>
+                </a:schemeClr>
+              </a:gs>
+              <a:gs pos="100000">
+                <a:schemeClr val="accent5">
+                  <a:lumMod val="30000"/>
+                  <a:lumOff val="70000"/>
+                </a:schemeClr>
+              </a:gs>
+            </a:gsLst>
+            <a:lin ang="5400000" scaled="1"/>
+            <a:tileRect/>
+          </a:gradFill>
+        </p:spPr>
+        <p:style>
+          <a:lnRef idx="2">
+            <a:schemeClr val="accent1">
+              <a:shade val="50000"/>
+            </a:schemeClr>
+          </a:lnRef>
+          <a:fillRef idx="1">
+            <a:schemeClr val="accent1"/>
+          </a:fillRef>
+          <a:effectRef idx="0">
+            <a:schemeClr val="accent1"/>
+          </a:effectRef>
+          <a:fontRef idx="minor">
+            <a:schemeClr val="lt1"/>
+          </a:fontRef>
+        </p:style>
+        <p:txBody>
+          <a:bodyPr rtlCol="0" anchor="ctr"/>
+          <a:lstStyle/>
+          <a:p>
+            <a:pPr algn="ctr"/>
+            <a:r>
+              <a:rPr lang="en-US" dirty="0">
+                <a:solidFill>
+                  <a:schemeClr val="tx1"/>
+                </a:solidFill>
+              </a:rPr>
+              <a:t>D3</a:t>
+            </a:r>
+          </a:p>
+        </p:txBody>
+      </p:sp>
+      <p:sp>
+        <p:nvSpPr>
+          <p:cNvPr id="11" name="Rounded Rectangle 10">
+            <a:extLst>
+              <a:ext uri="{FF2B5EF4-FFF2-40B4-BE49-F238E27FC236}">
+                <a16:creationId xmlns:a16="http://schemas.microsoft.com/office/drawing/2014/main" id="{4C8EE817-3131-6D4D-959D-EB2EE5E57F08}"/>
+              </a:ext>
+            </a:extLst>
+          </p:cNvPr>
+          <p:cNvSpPr/>
+          <p:nvPr/>
+        </p:nvSpPr>
+        <p:spPr>
+          <a:xfrm>
+            <a:off x="2983486" y="3677886"/>
+            <a:ext cx="641267" cy="641267"/>
+          </a:xfrm>
+          <a:prstGeom prst="roundRect">
+            <a:avLst/>
+          </a:prstGeom>
+          <a:gradFill flip="none" rotWithShape="1">
+            <a:gsLst>
+              <a:gs pos="0">
+                <a:schemeClr val="accent5">
+                  <a:lumMod val="5000"/>
+                  <a:lumOff val="95000"/>
+                </a:schemeClr>
+              </a:gs>
+              <a:gs pos="74000">
+                <a:schemeClr val="accent5">
+                  <a:lumMod val="45000"/>
+                  <a:lumOff val="55000"/>
+                </a:schemeClr>
+              </a:gs>
+              <a:gs pos="83000">
+                <a:schemeClr val="accent5">
+                  <a:lumMod val="45000"/>
+                  <a:lumOff val="55000"/>
+                </a:schemeClr>
+              </a:gs>
+              <a:gs pos="100000">
+                <a:schemeClr val="accent5">
+                  <a:lumMod val="30000"/>
+                  <a:lumOff val="70000"/>
+                </a:schemeClr>
+              </a:gs>
+            </a:gsLst>
+            <a:lin ang="5400000" scaled="1"/>
+            <a:tileRect/>
+          </a:gradFill>
+        </p:spPr>
+        <p:style>
+          <a:lnRef idx="2">
+            <a:schemeClr val="accent1">
+              <a:shade val="50000"/>
+            </a:schemeClr>
+          </a:lnRef>
+          <a:fillRef idx="1">
+            <a:schemeClr val="accent1"/>
+          </a:fillRef>
+          <a:effectRef idx="0">
+            <a:schemeClr val="accent1"/>
+          </a:effectRef>
+          <a:fontRef idx="minor">
+            <a:schemeClr val="lt1"/>
+          </a:fontRef>
+        </p:style>
+        <p:txBody>
+          <a:bodyPr rtlCol="0" anchor="ctr"/>
+          <a:lstStyle/>
+          <a:p>
+            <a:pPr algn="ctr"/>
+            <a:r>
+              <a:rPr lang="en-US" dirty="0">
+                <a:solidFill>
+                  <a:schemeClr val="tx1"/>
+                </a:solidFill>
+              </a:rPr>
+              <a:t>D2</a:t>
+            </a:r>
+          </a:p>
+        </p:txBody>
+      </p:sp>
+      <p:sp>
+        <p:nvSpPr>
+          <p:cNvPr id="12" name="Rounded Rectangle 11">
+            <a:extLst>
+              <a:ext uri="{FF2B5EF4-FFF2-40B4-BE49-F238E27FC236}">
+                <a16:creationId xmlns:a16="http://schemas.microsoft.com/office/drawing/2014/main" id="{CBC73F86-3905-F947-96B1-9BC6C1C3EF70}"/>
+              </a:ext>
+            </a:extLst>
+          </p:cNvPr>
+          <p:cNvSpPr/>
+          <p:nvPr/>
+        </p:nvSpPr>
+        <p:spPr>
+          <a:xfrm>
+            <a:off x="2983487" y="2909021"/>
+            <a:ext cx="641267" cy="641267"/>
+          </a:xfrm>
+          <a:prstGeom prst="roundRect">
+            <a:avLst/>
+          </a:prstGeom>
+          <a:gradFill flip="none" rotWithShape="1">
+            <a:gsLst>
+              <a:gs pos="0">
+                <a:schemeClr val="accent5">
+                  <a:lumMod val="5000"/>
+                  <a:lumOff val="95000"/>
+                </a:schemeClr>
+              </a:gs>
+              <a:gs pos="74000">
+                <a:schemeClr val="accent5">
+                  <a:lumMod val="45000"/>
+                  <a:lumOff val="55000"/>
+                </a:schemeClr>
+              </a:gs>
+              <a:gs pos="83000">
+                <a:schemeClr val="accent5">
+                  <a:lumMod val="45000"/>
+                  <a:lumOff val="55000"/>
+                </a:schemeClr>
+              </a:gs>
+              <a:gs pos="100000">
+                <a:schemeClr val="accent5">
+                  <a:lumMod val="30000"/>
+                  <a:lumOff val="70000"/>
+                </a:schemeClr>
+              </a:gs>
+            </a:gsLst>
+            <a:lin ang="5400000" scaled="1"/>
+            <a:tileRect/>
+          </a:gradFill>
+        </p:spPr>
+        <p:style>
+          <a:lnRef idx="2">
+            <a:schemeClr val="accent1">
+              <a:shade val="50000"/>
+            </a:schemeClr>
+          </a:lnRef>
+          <a:fillRef idx="1">
+            <a:schemeClr val="accent1"/>
+          </a:fillRef>
+          <a:effectRef idx="0">
+            <a:schemeClr val="accent1"/>
+          </a:effectRef>
+          <a:fontRef idx="minor">
+            <a:schemeClr val="lt1"/>
+          </a:fontRef>
+        </p:style>
+        <p:txBody>
+          <a:bodyPr rtlCol="0" anchor="ctr"/>
+          <a:lstStyle/>
+          <a:p>
+            <a:pPr algn="ctr"/>
+            <a:r>
+              <a:rPr lang="en-US" dirty="0">
+                <a:solidFill>
+                  <a:schemeClr val="tx1"/>
+                </a:solidFill>
+              </a:rPr>
+              <a:t>D1</a:t>
+            </a:r>
+          </a:p>
+        </p:txBody>
+      </p:sp>
+      <p:sp>
+        <p:nvSpPr>
+          <p:cNvPr id="13" name="TextBox 12">
+            <a:extLst>
+              <a:ext uri="{FF2B5EF4-FFF2-40B4-BE49-F238E27FC236}">
+                <a16:creationId xmlns:a16="http://schemas.microsoft.com/office/drawing/2014/main" id="{0DEDBA2C-7A2B-1947-B842-04FB8C4FA973}"/>
+              </a:ext>
+            </a:extLst>
+          </p:cNvPr>
+          <p:cNvSpPr txBox="1"/>
+          <p:nvPr/>
+        </p:nvSpPr>
+        <p:spPr>
+          <a:xfrm>
+            <a:off x="1842388" y="952581"/>
+            <a:ext cx="816249" cy="369332"/>
+          </a:xfrm>
+          <a:prstGeom prst="rect">
+            <a:avLst/>
+          </a:prstGeom>
+          <a:noFill/>
+        </p:spPr>
+        <p:txBody>
+          <a:bodyPr wrap="none" rtlCol="0">
+            <a:spAutoFit/>
+          </a:bodyPr>
+          <a:lstStyle/>
+          <a:p>
+            <a:r>
+              <a:rPr lang="en-US" dirty="0"/>
+              <a:t>Rank 0</a:t>
+            </a:r>
+          </a:p>
+        </p:txBody>
+      </p:sp>
+      <p:sp>
+        <p:nvSpPr>
+          <p:cNvPr id="14" name="TextBox 13">
+            <a:extLst>
+              <a:ext uri="{FF2B5EF4-FFF2-40B4-BE49-F238E27FC236}">
+                <a16:creationId xmlns:a16="http://schemas.microsoft.com/office/drawing/2014/main" id="{DE4770D9-8ADF-EE47-A021-5D23A31E9607}"/>
+              </a:ext>
+            </a:extLst>
+          </p:cNvPr>
+          <p:cNvSpPr txBox="1"/>
+          <p:nvPr/>
+        </p:nvSpPr>
+        <p:spPr>
+          <a:xfrm>
+            <a:off x="1842388" y="2276123"/>
+            <a:ext cx="816249" cy="369332"/>
+          </a:xfrm>
+          <a:prstGeom prst="rect">
+            <a:avLst/>
+          </a:prstGeom>
+          <a:noFill/>
+        </p:spPr>
+        <p:txBody>
+          <a:bodyPr wrap="none" rtlCol="0">
+            <a:spAutoFit/>
+          </a:bodyPr>
+          <a:lstStyle/>
+          <a:p>
+            <a:r>
+              <a:rPr lang="en-US" dirty="0"/>
+              <a:t>Rank 1</a:t>
+            </a:r>
+          </a:p>
+        </p:txBody>
+      </p:sp>
+      <p:sp>
+        <p:nvSpPr>
+          <p:cNvPr id="15" name="TextBox 14">
+            <a:extLst>
+              <a:ext uri="{FF2B5EF4-FFF2-40B4-BE49-F238E27FC236}">
+                <a16:creationId xmlns:a16="http://schemas.microsoft.com/office/drawing/2014/main" id="{31B118A3-1571-7145-BCD2-86F033D2D7D7}"/>
+              </a:ext>
+            </a:extLst>
+          </p:cNvPr>
+          <p:cNvSpPr txBox="1"/>
+          <p:nvPr/>
+        </p:nvSpPr>
+        <p:spPr>
+          <a:xfrm>
+            <a:off x="1842388" y="3044147"/>
+            <a:ext cx="816249" cy="369332"/>
+          </a:xfrm>
+          <a:prstGeom prst="rect">
+            <a:avLst/>
+          </a:prstGeom>
+          <a:noFill/>
+        </p:spPr>
+        <p:txBody>
+          <a:bodyPr wrap="none" rtlCol="0">
+            <a:spAutoFit/>
+          </a:bodyPr>
+          <a:lstStyle/>
+          <a:p>
+            <a:r>
+              <a:rPr lang="en-US" dirty="0"/>
+              <a:t>Rank 2</a:t>
+            </a:r>
+          </a:p>
+        </p:txBody>
+      </p:sp>
+      <p:sp>
+        <p:nvSpPr>
+          <p:cNvPr id="17" name="TextBox 16">
+            <a:extLst>
+              <a:ext uri="{FF2B5EF4-FFF2-40B4-BE49-F238E27FC236}">
+                <a16:creationId xmlns:a16="http://schemas.microsoft.com/office/drawing/2014/main" id="{551D0640-247F-E447-8676-EEC9BDCEE0EF}"/>
+              </a:ext>
+            </a:extLst>
+          </p:cNvPr>
+          <p:cNvSpPr txBox="1"/>
+          <p:nvPr/>
+        </p:nvSpPr>
+        <p:spPr>
+          <a:xfrm>
+            <a:off x="1842388" y="3813853"/>
+            <a:ext cx="816249" cy="369332"/>
+          </a:xfrm>
+          <a:prstGeom prst="rect">
+            <a:avLst/>
+          </a:prstGeom>
+          <a:noFill/>
+        </p:spPr>
+        <p:txBody>
+          <a:bodyPr wrap="none" rtlCol="0">
+            <a:spAutoFit/>
+          </a:bodyPr>
+          <a:lstStyle/>
+          <a:p>
+            <a:r>
+              <a:rPr lang="en-US" dirty="0"/>
+              <a:t>Rank 3</a:t>
+            </a:r>
+          </a:p>
+        </p:txBody>
+      </p:sp>
+      <p:sp>
+        <p:nvSpPr>
+          <p:cNvPr id="18" name="TextBox 17">
+            <a:extLst>
+              <a:ext uri="{FF2B5EF4-FFF2-40B4-BE49-F238E27FC236}">
+                <a16:creationId xmlns:a16="http://schemas.microsoft.com/office/drawing/2014/main" id="{3E341B3A-FB70-AD42-AFFB-89BF2E93798B}"/>
+              </a:ext>
+            </a:extLst>
+          </p:cNvPr>
+          <p:cNvSpPr txBox="1"/>
+          <p:nvPr/>
+        </p:nvSpPr>
+        <p:spPr>
+          <a:xfrm>
+            <a:off x="1844330" y="4582718"/>
+            <a:ext cx="816249" cy="369332"/>
+          </a:xfrm>
+          <a:prstGeom prst="rect">
+            <a:avLst/>
+          </a:prstGeom>
+          <a:noFill/>
+        </p:spPr>
+        <p:txBody>
+          <a:bodyPr wrap="none" rtlCol="0">
+            <a:spAutoFit/>
+          </a:bodyPr>
+          <a:lstStyle/>
+          <a:p>
+            <a:r>
+              <a:rPr lang="en-US" dirty="0"/>
+              <a:t>Rank 4</a:t>
+            </a:r>
+          </a:p>
+        </p:txBody>
+      </p:sp>
+      <p:cxnSp>
+        <p:nvCxnSpPr>
+          <p:cNvPr id="20" name="Elbow Connector 19">
+            <a:extLst>
+              <a:ext uri="{FF2B5EF4-FFF2-40B4-BE49-F238E27FC236}">
+                <a16:creationId xmlns:a16="http://schemas.microsoft.com/office/drawing/2014/main" id="{3F530081-CD8F-A940-8DC9-B37605D28486}"/>
+              </a:ext>
+            </a:extLst>
+          </p:cNvPr>
+          <p:cNvCxnSpPr>
+            <a:stCxn id="4" idx="2"/>
+            <a:endCxn id="8" idx="3"/>
+          </p:cNvCxnSpPr>
+          <p:nvPr/>
+        </p:nvCxnSpPr>
+        <p:spPr>
+          <a:xfrm rot="5400000">
+            <a:off x="3382083" y="1670674"/>
+            <a:ext cx="1031484" cy="548748"/>
+          </a:xfrm>
+          <a:prstGeom prst="bentConnector2">
+            <a:avLst/>
+          </a:prstGeom>
+          <a:ln w="50800">
+            <a:headEnd type="triangle"/>
+            <a:tailEnd type="oval"/>
+          </a:ln>
+        </p:spPr>
+        <p:style>
+          <a:lnRef idx="1">
+            <a:schemeClr val="accent1"/>
+          </a:lnRef>
+          <a:fillRef idx="0">
+            <a:schemeClr val="accent1"/>
+          </a:fillRef>
+          <a:effectRef idx="0">
+            <a:schemeClr val="accent1"/>
+          </a:effectRef>
+          <a:fontRef idx="minor">
+            <a:schemeClr val="tx1"/>
+          </a:fontRef>
+        </p:style>
+      </p:cxnSp>
+      <p:cxnSp>
+        <p:nvCxnSpPr>
+          <p:cNvPr id="21" name="Elbow Connector 20">
+            <a:extLst>
+              <a:ext uri="{FF2B5EF4-FFF2-40B4-BE49-F238E27FC236}">
+                <a16:creationId xmlns:a16="http://schemas.microsoft.com/office/drawing/2014/main" id="{F3178403-84E6-B44F-9214-E569082EDC1D}"/>
+              </a:ext>
+            </a:extLst>
+          </p:cNvPr>
+          <p:cNvCxnSpPr>
+            <a:cxnSpLocks/>
+            <a:stCxn id="5" idx="2"/>
+            <a:endCxn id="12" idx="3"/>
+          </p:cNvCxnSpPr>
+          <p:nvPr/>
+        </p:nvCxnSpPr>
+        <p:spPr>
+          <a:xfrm rot="5400000">
+            <a:off x="3318936" y="1735124"/>
+            <a:ext cx="1800349" cy="1188712"/>
+          </a:xfrm>
+          <a:prstGeom prst="bentConnector2">
+            <a:avLst/>
+          </a:prstGeom>
+          <a:ln w="50800">
+            <a:headEnd type="triangle"/>
+            <a:tailEnd type="oval"/>
+          </a:ln>
+        </p:spPr>
+        <p:style>
+          <a:lnRef idx="1">
+            <a:schemeClr val="accent1"/>
+          </a:lnRef>
+          <a:fillRef idx="0">
+            <a:schemeClr val="accent1"/>
+          </a:fillRef>
+          <a:effectRef idx="0">
+            <a:schemeClr val="accent1"/>
+          </a:effectRef>
+          <a:fontRef idx="minor">
+            <a:schemeClr val="tx1"/>
+          </a:fontRef>
+        </p:style>
+      </p:cxnSp>
+      <p:cxnSp>
+        <p:nvCxnSpPr>
+          <p:cNvPr id="22" name="Elbow Connector 21">
+            <a:extLst>
+              <a:ext uri="{FF2B5EF4-FFF2-40B4-BE49-F238E27FC236}">
+                <a16:creationId xmlns:a16="http://schemas.microsoft.com/office/drawing/2014/main" id="{0E4317DC-6F81-E74F-94D8-5696976192FB}"/>
+              </a:ext>
+            </a:extLst>
+          </p:cNvPr>
+          <p:cNvCxnSpPr>
+            <a:cxnSpLocks/>
+            <a:stCxn id="6" idx="2"/>
+            <a:endCxn id="11" idx="3"/>
+          </p:cNvCxnSpPr>
+          <p:nvPr/>
+        </p:nvCxnSpPr>
+        <p:spPr>
+          <a:xfrm rot="5400000">
+            <a:off x="3255136" y="1798923"/>
+            <a:ext cx="2569214" cy="1829980"/>
+          </a:xfrm>
+          <a:prstGeom prst="bentConnector2">
+            <a:avLst/>
+          </a:prstGeom>
+          <a:ln w="50800">
+            <a:headEnd type="triangle"/>
+            <a:tailEnd type="oval"/>
+          </a:ln>
+        </p:spPr>
+        <p:style>
+          <a:lnRef idx="1">
+            <a:schemeClr val="accent1"/>
+          </a:lnRef>
+          <a:fillRef idx="0">
+            <a:schemeClr val="accent1"/>
+          </a:fillRef>
+          <a:effectRef idx="0">
+            <a:schemeClr val="accent1"/>
+          </a:effectRef>
+          <a:fontRef idx="minor">
+            <a:schemeClr val="tx1"/>
+          </a:fontRef>
+        </p:style>
+      </p:cxnSp>
+      <p:cxnSp>
+        <p:nvCxnSpPr>
+          <p:cNvPr id="23" name="Elbow Connector 22">
+            <a:extLst>
+              <a:ext uri="{FF2B5EF4-FFF2-40B4-BE49-F238E27FC236}">
+                <a16:creationId xmlns:a16="http://schemas.microsoft.com/office/drawing/2014/main" id="{44632BB6-6AD3-1741-9203-DDBE38617909}"/>
+              </a:ext>
+            </a:extLst>
+          </p:cNvPr>
+          <p:cNvCxnSpPr>
+            <a:cxnSpLocks/>
+            <a:stCxn id="7" idx="2"/>
+            <a:endCxn id="10" idx="3"/>
+          </p:cNvCxnSpPr>
+          <p:nvPr/>
+        </p:nvCxnSpPr>
+        <p:spPr>
+          <a:xfrm rot="5400000">
+            <a:off x="3191337" y="1862721"/>
+            <a:ext cx="3338079" cy="2471248"/>
+          </a:xfrm>
+          <a:prstGeom prst="bentConnector2">
+            <a:avLst/>
+          </a:prstGeom>
+          <a:ln w="50800">
+            <a:headEnd type="triangle"/>
+            <a:tailEnd type="oval"/>
+          </a:ln>
+        </p:spPr>
+        <p:style>
+          <a:lnRef idx="1">
+            <a:schemeClr val="accent1"/>
+          </a:lnRef>
+          <a:fillRef idx="0">
+            <a:schemeClr val="accent1"/>
+          </a:fillRef>
+          <a:effectRef idx="0">
+            <a:schemeClr val="accent1"/>
+          </a:effectRef>
+          <a:fontRef idx="minor">
+            <a:schemeClr val="tx1"/>
+          </a:fontRef>
+        </p:style>
+      </p:cxnSp>
+    </p:spTree>
+    <p:extLst>
+      <p:ext uri="{BB962C8B-B14F-4D97-AF65-F5344CB8AC3E}">
+        <p14:creationId xmlns:p14="http://schemas.microsoft.com/office/powerpoint/2010/main" val="2951271852"/>
+      </p:ext>
+    </p:extLst>
+  </p:cSld>
+  <p:clrMapOvr>
+    <a:masterClrMapping/>
+  </p:clrMapOvr>
+</p:sld>
+</file>
+
+<file path=ppt/slides/slide4.xml><?xml version="1.0" encoding="utf-8"?>
+<p:sld xmlns:a="http://schemas.openxmlformats.org/drawingml/2006/main" xmlns:r="http://schemas.openxmlformats.org/officeDocument/2006/relationships" xmlns:p="http://schemas.openxmlformats.org/presentationml/2006/main">
+  <p:cSld>
+    <p:spTree>
+      <p:nvGrpSpPr>
+        <p:cNvPr id="1" name=""/>
+        <p:cNvGrpSpPr/>
+        <p:nvPr/>
+      </p:nvGrpSpPr>
+      <p:grpSpPr>
+        <a:xfrm>
+          <a:off x="0" y="0"/>
+          <a:ext cx="0" cy="0"/>
+          <a:chOff x="0" y="0"/>
+          <a:chExt cx="0" cy="0"/>
+        </a:xfrm>
+      </p:grpSpPr>
+      <p:sp>
+        <p:nvSpPr>
+          <p:cNvPr id="24" name="Rounded Rectangle 23">
+            <a:extLst>
+              <a:ext uri="{FF2B5EF4-FFF2-40B4-BE49-F238E27FC236}">
+                <a16:creationId xmlns:a16="http://schemas.microsoft.com/office/drawing/2014/main" id="{EACAB3F2-93C1-8440-884D-90F8C995B2D7}"/>
+              </a:ext>
+            </a:extLst>
+          </p:cNvPr>
+          <p:cNvSpPr/>
+          <p:nvPr/>
+        </p:nvSpPr>
+        <p:spPr>
+          <a:xfrm>
+            <a:off x="2915466" y="561417"/>
+            <a:ext cx="3376152" cy="1089499"/>
+          </a:xfrm>
+          <a:prstGeom prst="roundRect">
+            <a:avLst/>
+          </a:prstGeom>
+          <a:gradFill flip="none" rotWithShape="1">
+            <a:gsLst>
+              <a:gs pos="0">
+                <a:schemeClr val="accent5">
+                  <a:lumMod val="5000"/>
+                  <a:lumOff val="95000"/>
+                </a:schemeClr>
+              </a:gs>
+              <a:gs pos="74000">
+                <a:schemeClr val="accent5">
+                  <a:lumMod val="45000"/>
+                  <a:lumOff val="55000"/>
+                </a:schemeClr>
+              </a:gs>
+              <a:gs pos="83000">
+                <a:schemeClr val="accent5">
+                  <a:lumMod val="45000"/>
+                  <a:lumOff val="55000"/>
+                </a:schemeClr>
+              </a:gs>
+              <a:gs pos="100000">
+                <a:schemeClr val="accent5">
+                  <a:lumMod val="30000"/>
+                  <a:lumOff val="70000"/>
+                </a:schemeClr>
+              </a:gs>
+            </a:gsLst>
+            <a:lin ang="5400000" scaled="1"/>
+            <a:tileRect/>
+          </a:gradFill>
+        </p:spPr>
+        <p:style>
+          <a:lnRef idx="2">
+            <a:schemeClr val="accent1">
+              <a:shade val="50000"/>
+            </a:schemeClr>
+          </a:lnRef>
+          <a:fillRef idx="1">
+            <a:schemeClr val="accent1"/>
+          </a:fillRef>
+          <a:effectRef idx="0">
+            <a:schemeClr val="accent1"/>
+          </a:effectRef>
+          <a:fontRef idx="minor">
+            <a:schemeClr val="lt1"/>
+          </a:fontRef>
+        </p:style>
+        <p:txBody>
+          <a:bodyPr rtlCol="0" anchor="t" anchorCtr="0"/>
+          <a:lstStyle/>
+          <a:p>
+            <a:r>
+              <a:rPr lang="en-US" dirty="0" err="1">
+                <a:solidFill>
+                  <a:schemeClr val="tx1"/>
+                </a:solidFill>
+              </a:rPr>
+              <a:t>manager.py</a:t>
+            </a:r>
+            <a:endParaRPr lang="en-US" dirty="0">
+              <a:solidFill>
+                <a:schemeClr val="tx1"/>
+              </a:solidFill>
+            </a:endParaRPr>
+          </a:p>
+        </p:txBody>
+      </p:sp>
+      <p:sp>
+        <p:nvSpPr>
+          <p:cNvPr id="4" name="Rounded Rectangle 3">
+            <a:extLst>
+              <a:ext uri="{FF2B5EF4-FFF2-40B4-BE49-F238E27FC236}">
+                <a16:creationId xmlns:a16="http://schemas.microsoft.com/office/drawing/2014/main" id="{8ACB91C4-10F1-B74A-A783-8EAF058E8AA7}"/>
+              </a:ext>
+            </a:extLst>
+          </p:cNvPr>
+          <p:cNvSpPr/>
+          <p:nvPr/>
+        </p:nvSpPr>
+        <p:spPr>
+          <a:xfrm>
+            <a:off x="4629711" y="816613"/>
+            <a:ext cx="1457414" cy="641267"/>
+          </a:xfrm>
+          <a:prstGeom prst="roundRect">
+            <a:avLst/>
+          </a:prstGeom>
+          <a:gradFill flip="none" rotWithShape="1">
+            <a:gsLst>
+              <a:gs pos="0">
+                <a:schemeClr val="accent5">
+                  <a:lumMod val="5000"/>
+                  <a:lumOff val="95000"/>
+                </a:schemeClr>
+              </a:gs>
+              <a:gs pos="74000">
+                <a:schemeClr val="accent5">
+                  <a:lumMod val="45000"/>
+                  <a:lumOff val="55000"/>
+                </a:schemeClr>
+              </a:gs>
+              <a:gs pos="83000">
+                <a:schemeClr val="accent5">
+                  <a:lumMod val="45000"/>
+                  <a:lumOff val="55000"/>
+                </a:schemeClr>
+              </a:gs>
+              <a:gs pos="100000">
+                <a:schemeClr val="accent5">
+                  <a:lumMod val="30000"/>
+                  <a:lumOff val="70000"/>
+                </a:schemeClr>
+              </a:gs>
+            </a:gsLst>
+            <a:lin ang="5400000" scaled="1"/>
+            <a:tileRect/>
+          </a:gradFill>
+        </p:spPr>
+        <p:style>
+          <a:lnRef idx="2">
+            <a:schemeClr val="accent1">
+              <a:shade val="50000"/>
+            </a:schemeClr>
+          </a:lnRef>
+          <a:fillRef idx="1">
+            <a:schemeClr val="accent1"/>
+          </a:fillRef>
+          <a:effectRef idx="0">
+            <a:schemeClr val="accent1"/>
+          </a:effectRef>
+          <a:fontRef idx="minor">
+            <a:schemeClr val="lt1"/>
+          </a:fontRef>
+        </p:style>
+        <p:txBody>
+          <a:bodyPr rtlCol="0" anchor="ctr"/>
+          <a:lstStyle/>
+          <a:p>
+            <a:pPr algn="ctr"/>
+            <a:r>
+              <a:rPr lang="en-US" dirty="0" err="1">
+                <a:solidFill>
+                  <a:schemeClr val="tx1"/>
+                </a:solidFill>
+              </a:rPr>
+              <a:t>worker.py</a:t>
+            </a:r>
+            <a:endParaRPr lang="en-US" dirty="0">
+              <a:solidFill>
+                <a:schemeClr val="tx1"/>
+              </a:solidFill>
+            </a:endParaRPr>
+          </a:p>
+        </p:txBody>
+      </p:sp>
+      <p:sp>
+        <p:nvSpPr>
+          <p:cNvPr id="8" name="Rounded Rectangle 7">
+            <a:extLst>
+              <a:ext uri="{FF2B5EF4-FFF2-40B4-BE49-F238E27FC236}">
+                <a16:creationId xmlns:a16="http://schemas.microsoft.com/office/drawing/2014/main" id="{D11A220F-CE94-E04D-B63F-D49E0A1C4B89}"/>
+              </a:ext>
+            </a:extLst>
+          </p:cNvPr>
+          <p:cNvSpPr/>
+          <p:nvPr/>
+        </p:nvSpPr>
+        <p:spPr>
+          <a:xfrm>
+            <a:off x="3172297" y="2226745"/>
+            <a:ext cx="1457414" cy="641267"/>
+          </a:xfrm>
+          <a:prstGeom prst="roundRect">
+            <a:avLst/>
+          </a:prstGeom>
+          <a:gradFill flip="none" rotWithShape="1">
+            <a:gsLst>
+              <a:gs pos="0">
+                <a:schemeClr val="accent5">
+                  <a:lumMod val="5000"/>
+                  <a:lumOff val="95000"/>
+                </a:schemeClr>
+              </a:gs>
+              <a:gs pos="74000">
+                <a:schemeClr val="accent5">
+                  <a:lumMod val="45000"/>
+                  <a:lumOff val="55000"/>
+                </a:schemeClr>
+              </a:gs>
+              <a:gs pos="83000">
+                <a:schemeClr val="accent5">
+                  <a:lumMod val="45000"/>
+                  <a:lumOff val="55000"/>
+                </a:schemeClr>
+              </a:gs>
+              <a:gs pos="100000">
+                <a:schemeClr val="accent5">
+                  <a:lumMod val="30000"/>
+                  <a:lumOff val="70000"/>
+                </a:schemeClr>
+              </a:gs>
+            </a:gsLst>
+            <a:lin ang="5400000" scaled="1"/>
+            <a:tileRect/>
+          </a:gradFill>
+        </p:spPr>
+        <p:style>
+          <a:lnRef idx="2">
+            <a:schemeClr val="accent1">
+              <a:shade val="50000"/>
+            </a:schemeClr>
+          </a:lnRef>
+          <a:fillRef idx="1">
+            <a:schemeClr val="accent1"/>
+          </a:fillRef>
+          <a:effectRef idx="0">
+            <a:schemeClr val="accent1"/>
+          </a:effectRef>
+          <a:fontRef idx="minor">
+            <a:schemeClr val="lt1"/>
+          </a:fontRef>
+        </p:style>
+        <p:txBody>
+          <a:bodyPr rtlCol="0" anchor="ctr"/>
+          <a:lstStyle/>
+          <a:p>
+            <a:pPr algn="ctr"/>
+            <a:r>
+              <a:rPr lang="en-US" dirty="0" err="1">
+                <a:solidFill>
+                  <a:schemeClr val="tx1"/>
+                </a:solidFill>
+              </a:rPr>
+              <a:t>Worker.py</a:t>
+            </a:r>
+            <a:endParaRPr lang="en-US" dirty="0">
+              <a:solidFill>
+                <a:schemeClr val="tx1"/>
+              </a:solidFill>
+            </a:endParaRPr>
+          </a:p>
+        </p:txBody>
+      </p:sp>
+      <p:sp>
+        <p:nvSpPr>
+          <p:cNvPr id="10" name="Rounded Rectangle 9">
+            <a:extLst>
+              <a:ext uri="{FF2B5EF4-FFF2-40B4-BE49-F238E27FC236}">
+                <a16:creationId xmlns:a16="http://schemas.microsoft.com/office/drawing/2014/main" id="{F2DD7FB6-F02B-A644-AAA5-3F6B3ED31FCE}"/>
+              </a:ext>
+            </a:extLst>
+          </p:cNvPr>
+          <p:cNvSpPr/>
+          <p:nvPr/>
+        </p:nvSpPr>
+        <p:spPr>
+          <a:xfrm>
+            <a:off x="3173598" y="4533340"/>
+            <a:ext cx="1457414" cy="641267"/>
+          </a:xfrm>
+          <a:prstGeom prst="roundRect">
+            <a:avLst/>
+          </a:prstGeom>
+          <a:gradFill flip="none" rotWithShape="1">
+            <a:gsLst>
+              <a:gs pos="0">
+                <a:schemeClr val="accent5">
+                  <a:lumMod val="5000"/>
+                  <a:lumOff val="95000"/>
+                </a:schemeClr>
+              </a:gs>
+              <a:gs pos="74000">
+                <a:schemeClr val="accent5">
+                  <a:lumMod val="45000"/>
+                  <a:lumOff val="55000"/>
+                </a:schemeClr>
+              </a:gs>
+              <a:gs pos="83000">
+                <a:schemeClr val="accent5">
+                  <a:lumMod val="45000"/>
+                  <a:lumOff val="55000"/>
+                </a:schemeClr>
+              </a:gs>
+              <a:gs pos="100000">
+                <a:schemeClr val="accent5">
+                  <a:lumMod val="30000"/>
+                  <a:lumOff val="70000"/>
+                </a:schemeClr>
+              </a:gs>
+            </a:gsLst>
+            <a:lin ang="5400000" scaled="1"/>
+            <a:tileRect/>
+          </a:gradFill>
+        </p:spPr>
+        <p:style>
+          <a:lnRef idx="2">
+            <a:schemeClr val="accent1">
+              <a:shade val="50000"/>
+            </a:schemeClr>
+          </a:lnRef>
+          <a:fillRef idx="1">
+            <a:schemeClr val="accent1"/>
+          </a:fillRef>
+          <a:effectRef idx="0">
+            <a:schemeClr val="accent1"/>
+          </a:effectRef>
+          <a:fontRef idx="minor">
+            <a:schemeClr val="lt1"/>
+          </a:fontRef>
+        </p:style>
+        <p:txBody>
+          <a:bodyPr rtlCol="0" anchor="ctr"/>
+          <a:lstStyle/>
+          <a:p>
+            <a:pPr algn="ctr"/>
+            <a:r>
+              <a:rPr lang="en-US" dirty="0" err="1">
+                <a:solidFill>
+                  <a:schemeClr val="tx1"/>
+                </a:solidFill>
+              </a:rPr>
+              <a:t>worker.py</a:t>
+            </a:r>
+            <a:endParaRPr lang="en-US" dirty="0">
+              <a:solidFill>
+                <a:schemeClr val="tx1"/>
+              </a:solidFill>
+            </a:endParaRPr>
+          </a:p>
+        </p:txBody>
+      </p:sp>
+      <p:sp>
+        <p:nvSpPr>
+          <p:cNvPr id="11" name="Rounded Rectangle 10">
+            <a:extLst>
+              <a:ext uri="{FF2B5EF4-FFF2-40B4-BE49-F238E27FC236}">
+                <a16:creationId xmlns:a16="http://schemas.microsoft.com/office/drawing/2014/main" id="{4C8EE817-3131-6D4D-959D-EB2EE5E57F08}"/>
+              </a:ext>
+            </a:extLst>
+          </p:cNvPr>
+          <p:cNvSpPr/>
+          <p:nvPr/>
+        </p:nvSpPr>
+        <p:spPr>
+          <a:xfrm>
+            <a:off x="3173599" y="3764475"/>
+            <a:ext cx="1457414" cy="641267"/>
+          </a:xfrm>
+          <a:prstGeom prst="roundRect">
+            <a:avLst/>
+          </a:prstGeom>
+          <a:gradFill flip="none" rotWithShape="1">
+            <a:gsLst>
+              <a:gs pos="0">
+                <a:schemeClr val="accent5">
+                  <a:lumMod val="5000"/>
+                  <a:lumOff val="95000"/>
+                </a:schemeClr>
+              </a:gs>
+              <a:gs pos="74000">
+                <a:schemeClr val="accent5">
+                  <a:lumMod val="45000"/>
+                  <a:lumOff val="55000"/>
+                </a:schemeClr>
+              </a:gs>
+              <a:gs pos="83000">
+                <a:schemeClr val="accent5">
+                  <a:lumMod val="45000"/>
+                  <a:lumOff val="55000"/>
+                </a:schemeClr>
+              </a:gs>
+              <a:gs pos="100000">
+                <a:schemeClr val="accent5">
+                  <a:lumMod val="30000"/>
+                  <a:lumOff val="70000"/>
+                </a:schemeClr>
+              </a:gs>
+            </a:gsLst>
+            <a:lin ang="5400000" scaled="1"/>
+            <a:tileRect/>
+          </a:gradFill>
+        </p:spPr>
+        <p:style>
+          <a:lnRef idx="2">
+            <a:schemeClr val="accent1">
+              <a:shade val="50000"/>
+            </a:schemeClr>
+          </a:lnRef>
+          <a:fillRef idx="1">
+            <a:schemeClr val="accent1"/>
+          </a:fillRef>
+          <a:effectRef idx="0">
+            <a:schemeClr val="accent1"/>
+          </a:effectRef>
+          <a:fontRef idx="minor">
+            <a:schemeClr val="lt1"/>
+          </a:fontRef>
+        </p:style>
+        <p:txBody>
+          <a:bodyPr rtlCol="0" anchor="ctr"/>
+          <a:lstStyle/>
+          <a:p>
+            <a:pPr algn="ctr"/>
+            <a:r>
+              <a:rPr lang="en-US" dirty="0" err="1">
+                <a:solidFill>
+                  <a:schemeClr val="tx1"/>
+                </a:solidFill>
+              </a:rPr>
+              <a:t>worker.py</a:t>
+            </a:r>
+            <a:endParaRPr lang="en-US" dirty="0">
+              <a:solidFill>
+                <a:schemeClr val="tx1"/>
+              </a:solidFill>
+            </a:endParaRPr>
+          </a:p>
+        </p:txBody>
+      </p:sp>
+      <p:sp>
+        <p:nvSpPr>
+          <p:cNvPr id="12" name="Rounded Rectangle 11">
+            <a:extLst>
+              <a:ext uri="{FF2B5EF4-FFF2-40B4-BE49-F238E27FC236}">
+                <a16:creationId xmlns:a16="http://schemas.microsoft.com/office/drawing/2014/main" id="{CBC73F86-3905-F947-96B1-9BC6C1C3EF70}"/>
+              </a:ext>
+            </a:extLst>
+          </p:cNvPr>
+          <p:cNvSpPr/>
+          <p:nvPr/>
+        </p:nvSpPr>
+        <p:spPr>
+          <a:xfrm>
+            <a:off x="3173600" y="2995610"/>
+            <a:ext cx="1457414" cy="641267"/>
+          </a:xfrm>
+          <a:prstGeom prst="roundRect">
+            <a:avLst/>
+          </a:prstGeom>
+          <a:gradFill flip="none" rotWithShape="1">
+            <a:gsLst>
+              <a:gs pos="0">
+                <a:schemeClr val="accent5">
+                  <a:lumMod val="5000"/>
+                  <a:lumOff val="95000"/>
+                </a:schemeClr>
+              </a:gs>
+              <a:gs pos="74000">
+                <a:schemeClr val="accent5">
+                  <a:lumMod val="45000"/>
+                  <a:lumOff val="55000"/>
+                </a:schemeClr>
+              </a:gs>
+              <a:gs pos="83000">
+                <a:schemeClr val="accent5">
+                  <a:lumMod val="45000"/>
+                  <a:lumOff val="55000"/>
+                </a:schemeClr>
+              </a:gs>
+              <a:gs pos="100000">
+                <a:schemeClr val="accent5">
+                  <a:lumMod val="30000"/>
+                  <a:lumOff val="70000"/>
+                </a:schemeClr>
+              </a:gs>
+            </a:gsLst>
+            <a:lin ang="5400000" scaled="1"/>
+            <a:tileRect/>
+          </a:gradFill>
+        </p:spPr>
+        <p:style>
+          <a:lnRef idx="2">
+            <a:schemeClr val="accent1">
+              <a:shade val="50000"/>
+            </a:schemeClr>
+          </a:lnRef>
+          <a:fillRef idx="1">
+            <a:schemeClr val="accent1"/>
+          </a:fillRef>
+          <a:effectRef idx="0">
+            <a:schemeClr val="accent1"/>
+          </a:effectRef>
+          <a:fontRef idx="minor">
+            <a:schemeClr val="lt1"/>
+          </a:fontRef>
+        </p:style>
+        <p:txBody>
+          <a:bodyPr rtlCol="0" anchor="ctr"/>
+          <a:lstStyle/>
+          <a:p>
+            <a:pPr algn="ctr"/>
+            <a:r>
+              <a:rPr lang="en-US" dirty="0" err="1">
+                <a:solidFill>
+                  <a:schemeClr val="tx1"/>
+                </a:solidFill>
+              </a:rPr>
+              <a:t>worker.py</a:t>
+            </a:r>
+            <a:endParaRPr lang="en-US" dirty="0">
+              <a:solidFill>
+                <a:schemeClr val="tx1"/>
+              </a:solidFill>
+            </a:endParaRPr>
+          </a:p>
+        </p:txBody>
+      </p:sp>
+      <p:sp>
+        <p:nvSpPr>
+          <p:cNvPr id="13" name="TextBox 12">
+            <a:extLst>
+              <a:ext uri="{FF2B5EF4-FFF2-40B4-BE49-F238E27FC236}">
+                <a16:creationId xmlns:a16="http://schemas.microsoft.com/office/drawing/2014/main" id="{0DEDBA2C-7A2B-1947-B842-04FB8C4FA973}"/>
+              </a:ext>
+            </a:extLst>
+          </p:cNvPr>
+          <p:cNvSpPr txBox="1"/>
+          <p:nvPr/>
+        </p:nvSpPr>
+        <p:spPr>
+          <a:xfrm>
+            <a:off x="1842388" y="952581"/>
+            <a:ext cx="816249" cy="369332"/>
+          </a:xfrm>
+          <a:prstGeom prst="rect">
+            <a:avLst/>
+          </a:prstGeom>
+          <a:noFill/>
+        </p:spPr>
+        <p:txBody>
+          <a:bodyPr wrap="none" rtlCol="0">
+            <a:spAutoFit/>
+          </a:bodyPr>
+          <a:lstStyle/>
+          <a:p>
+            <a:r>
+              <a:rPr lang="en-US" dirty="0"/>
+              <a:t>Rank 0</a:t>
+            </a:r>
+          </a:p>
+        </p:txBody>
+      </p:sp>
+      <p:sp>
+        <p:nvSpPr>
+          <p:cNvPr id="14" name="TextBox 13">
+            <a:extLst>
+              <a:ext uri="{FF2B5EF4-FFF2-40B4-BE49-F238E27FC236}">
+                <a16:creationId xmlns:a16="http://schemas.microsoft.com/office/drawing/2014/main" id="{DE4770D9-8ADF-EE47-A021-5D23A31E9607}"/>
+              </a:ext>
+            </a:extLst>
+          </p:cNvPr>
+          <p:cNvSpPr txBox="1"/>
+          <p:nvPr/>
+        </p:nvSpPr>
+        <p:spPr>
+          <a:xfrm>
+            <a:off x="1842388" y="2276123"/>
+            <a:ext cx="816249" cy="369332"/>
+          </a:xfrm>
+          <a:prstGeom prst="rect">
+            <a:avLst/>
+          </a:prstGeom>
+          <a:noFill/>
+        </p:spPr>
+        <p:txBody>
+          <a:bodyPr wrap="none" rtlCol="0">
+            <a:spAutoFit/>
+          </a:bodyPr>
+          <a:lstStyle/>
+          <a:p>
+            <a:r>
+              <a:rPr lang="en-US" dirty="0"/>
+              <a:t>Rank 1</a:t>
+            </a:r>
+          </a:p>
+        </p:txBody>
+      </p:sp>
+      <p:sp>
+        <p:nvSpPr>
+          <p:cNvPr id="15" name="TextBox 14">
+            <a:extLst>
+              <a:ext uri="{FF2B5EF4-FFF2-40B4-BE49-F238E27FC236}">
+                <a16:creationId xmlns:a16="http://schemas.microsoft.com/office/drawing/2014/main" id="{31B118A3-1571-7145-BCD2-86F033D2D7D7}"/>
+              </a:ext>
+            </a:extLst>
+          </p:cNvPr>
+          <p:cNvSpPr txBox="1"/>
+          <p:nvPr/>
+        </p:nvSpPr>
+        <p:spPr>
+          <a:xfrm>
+            <a:off x="1842388" y="3044147"/>
+            <a:ext cx="816249" cy="369332"/>
+          </a:xfrm>
+          <a:prstGeom prst="rect">
+            <a:avLst/>
+          </a:prstGeom>
+          <a:noFill/>
+        </p:spPr>
+        <p:txBody>
+          <a:bodyPr wrap="none" rtlCol="0">
+            <a:spAutoFit/>
+          </a:bodyPr>
+          <a:lstStyle/>
+          <a:p>
+            <a:r>
+              <a:rPr lang="en-US" dirty="0"/>
+              <a:t>Rank 2</a:t>
+            </a:r>
+          </a:p>
+        </p:txBody>
+      </p:sp>
+      <p:sp>
+        <p:nvSpPr>
+          <p:cNvPr id="17" name="TextBox 16">
+            <a:extLst>
+              <a:ext uri="{FF2B5EF4-FFF2-40B4-BE49-F238E27FC236}">
+                <a16:creationId xmlns:a16="http://schemas.microsoft.com/office/drawing/2014/main" id="{551D0640-247F-E447-8676-EEC9BDCEE0EF}"/>
+              </a:ext>
+            </a:extLst>
+          </p:cNvPr>
+          <p:cNvSpPr txBox="1"/>
+          <p:nvPr/>
+        </p:nvSpPr>
+        <p:spPr>
+          <a:xfrm>
+            <a:off x="1842388" y="3813853"/>
+            <a:ext cx="816249" cy="369332"/>
+          </a:xfrm>
+          <a:prstGeom prst="rect">
+            <a:avLst/>
+          </a:prstGeom>
+          <a:noFill/>
+        </p:spPr>
+        <p:txBody>
+          <a:bodyPr wrap="none" rtlCol="0">
+            <a:spAutoFit/>
+          </a:bodyPr>
+          <a:lstStyle/>
+          <a:p>
+            <a:r>
+              <a:rPr lang="en-US" dirty="0"/>
+              <a:t>Rank 3</a:t>
+            </a:r>
+          </a:p>
+        </p:txBody>
+      </p:sp>
+      <p:sp>
+        <p:nvSpPr>
+          <p:cNvPr id="18" name="TextBox 17">
+            <a:extLst>
+              <a:ext uri="{FF2B5EF4-FFF2-40B4-BE49-F238E27FC236}">
+                <a16:creationId xmlns:a16="http://schemas.microsoft.com/office/drawing/2014/main" id="{3E341B3A-FB70-AD42-AFFB-89BF2E93798B}"/>
+              </a:ext>
+            </a:extLst>
+          </p:cNvPr>
+          <p:cNvSpPr txBox="1"/>
+          <p:nvPr/>
+        </p:nvSpPr>
+        <p:spPr>
+          <a:xfrm>
+            <a:off x="1844330" y="4582718"/>
+            <a:ext cx="816249" cy="369332"/>
+          </a:xfrm>
+          <a:prstGeom prst="rect">
+            <a:avLst/>
+          </a:prstGeom>
+          <a:noFill/>
+        </p:spPr>
+        <p:txBody>
+          <a:bodyPr wrap="none" rtlCol="0">
+            <a:spAutoFit/>
+          </a:bodyPr>
+          <a:lstStyle/>
+          <a:p>
+            <a:r>
+              <a:rPr lang="en-US" dirty="0"/>
+              <a:t>Rank 4</a:t>
+            </a:r>
+          </a:p>
+        </p:txBody>
+      </p:sp>
+      <p:cxnSp>
+        <p:nvCxnSpPr>
+          <p:cNvPr id="20" name="Elbow Connector 19">
+            <a:extLst>
+              <a:ext uri="{FF2B5EF4-FFF2-40B4-BE49-F238E27FC236}">
+                <a16:creationId xmlns:a16="http://schemas.microsoft.com/office/drawing/2014/main" id="{3F530081-CD8F-A940-8DC9-B37605D28486}"/>
+              </a:ext>
+            </a:extLst>
+          </p:cNvPr>
+          <p:cNvCxnSpPr>
+            <a:stCxn id="4" idx="2"/>
+            <a:endCxn id="8" idx="3"/>
+          </p:cNvCxnSpPr>
+          <p:nvPr/>
+        </p:nvCxnSpPr>
+        <p:spPr>
+          <a:xfrm rot="5400000">
+            <a:off x="4449316" y="1638276"/>
+            <a:ext cx="1089499" cy="728707"/>
+          </a:xfrm>
+          <a:prstGeom prst="bentConnector2">
+            <a:avLst/>
+          </a:prstGeom>
+          <a:ln w="50800">
+            <a:headEnd type="oval"/>
+            <a:tailEnd type="triangle"/>
+          </a:ln>
+        </p:spPr>
+        <p:style>
+          <a:lnRef idx="1">
+            <a:schemeClr val="accent1"/>
+          </a:lnRef>
+          <a:fillRef idx="0">
+            <a:schemeClr val="accent1"/>
+          </a:fillRef>
+          <a:effectRef idx="0">
+            <a:schemeClr val="accent1"/>
+          </a:effectRef>
+          <a:fontRef idx="minor">
+            <a:schemeClr val="tx1"/>
+          </a:fontRef>
+        </p:style>
+      </p:cxnSp>
+      <p:cxnSp>
+        <p:nvCxnSpPr>
+          <p:cNvPr id="21" name="Elbow Connector 20">
+            <a:extLst>
+              <a:ext uri="{FF2B5EF4-FFF2-40B4-BE49-F238E27FC236}">
+                <a16:creationId xmlns:a16="http://schemas.microsoft.com/office/drawing/2014/main" id="{F3178403-84E6-B44F-9214-E569082EDC1D}"/>
+              </a:ext>
+            </a:extLst>
+          </p:cNvPr>
+          <p:cNvCxnSpPr>
+            <a:cxnSpLocks/>
+            <a:stCxn id="4" idx="2"/>
+            <a:endCxn id="12" idx="3"/>
+          </p:cNvCxnSpPr>
+          <p:nvPr/>
+        </p:nvCxnSpPr>
+        <p:spPr>
+          <a:xfrm rot="5400000">
+            <a:off x="4065534" y="2023360"/>
+            <a:ext cx="1858364" cy="727404"/>
+          </a:xfrm>
+          <a:prstGeom prst="bentConnector2">
+            <a:avLst/>
+          </a:prstGeom>
+          <a:ln w="50800">
+            <a:headEnd type="oval"/>
+            <a:tailEnd type="triangle"/>
+          </a:ln>
+        </p:spPr>
+        <p:style>
+          <a:lnRef idx="1">
+            <a:schemeClr val="accent1"/>
+          </a:lnRef>
+          <a:fillRef idx="0">
+            <a:schemeClr val="accent1"/>
+          </a:fillRef>
+          <a:effectRef idx="0">
+            <a:schemeClr val="accent1"/>
+          </a:effectRef>
+          <a:fontRef idx="minor">
+            <a:schemeClr val="tx1"/>
+          </a:fontRef>
+        </p:style>
+      </p:cxnSp>
+      <p:cxnSp>
+        <p:nvCxnSpPr>
+          <p:cNvPr id="22" name="Elbow Connector 21">
+            <a:extLst>
+              <a:ext uri="{FF2B5EF4-FFF2-40B4-BE49-F238E27FC236}">
+                <a16:creationId xmlns:a16="http://schemas.microsoft.com/office/drawing/2014/main" id="{0E4317DC-6F81-E74F-94D8-5696976192FB}"/>
+              </a:ext>
+            </a:extLst>
+          </p:cNvPr>
+          <p:cNvCxnSpPr>
+            <a:cxnSpLocks/>
+            <a:stCxn id="4" idx="2"/>
+            <a:endCxn id="11" idx="3"/>
+          </p:cNvCxnSpPr>
+          <p:nvPr/>
+        </p:nvCxnSpPr>
+        <p:spPr>
+          <a:xfrm rot="5400000">
+            <a:off x="3681102" y="2407792"/>
+            <a:ext cx="2627229" cy="727405"/>
+          </a:xfrm>
+          <a:prstGeom prst="bentConnector2">
+            <a:avLst/>
+          </a:prstGeom>
+          <a:ln w="50800">
+            <a:headEnd type="oval"/>
+            <a:tailEnd type="triangle"/>
+          </a:ln>
+        </p:spPr>
+        <p:style>
+          <a:lnRef idx="1">
+            <a:schemeClr val="accent1"/>
+          </a:lnRef>
+          <a:fillRef idx="0">
+            <a:schemeClr val="accent1"/>
+          </a:fillRef>
+          <a:effectRef idx="0">
+            <a:schemeClr val="accent1"/>
+          </a:effectRef>
+          <a:fontRef idx="minor">
+            <a:schemeClr val="tx1"/>
+          </a:fontRef>
+        </p:style>
+      </p:cxnSp>
+      <p:cxnSp>
+        <p:nvCxnSpPr>
+          <p:cNvPr id="23" name="Elbow Connector 22">
+            <a:extLst>
+              <a:ext uri="{FF2B5EF4-FFF2-40B4-BE49-F238E27FC236}">
+                <a16:creationId xmlns:a16="http://schemas.microsoft.com/office/drawing/2014/main" id="{44632BB6-6AD3-1741-9203-DDBE38617909}"/>
+              </a:ext>
+            </a:extLst>
+          </p:cNvPr>
+          <p:cNvCxnSpPr>
+            <a:cxnSpLocks/>
+            <a:stCxn id="4" idx="2"/>
+            <a:endCxn id="10" idx="3"/>
+          </p:cNvCxnSpPr>
+          <p:nvPr/>
+        </p:nvCxnSpPr>
+        <p:spPr>
+          <a:xfrm rot="5400000">
+            <a:off x="3296668" y="2792224"/>
+            <a:ext cx="3396094" cy="727406"/>
+          </a:xfrm>
+          <a:prstGeom prst="bentConnector2">
+            <a:avLst/>
+          </a:prstGeom>
+          <a:ln w="50800">
+            <a:headEnd type="oval"/>
+            <a:tailEnd type="triangle"/>
+          </a:ln>
+        </p:spPr>
+        <p:style>
+          <a:lnRef idx="1">
+            <a:schemeClr val="accent1"/>
+          </a:lnRef>
+          <a:fillRef idx="0">
+            <a:schemeClr val="accent1"/>
+          </a:fillRef>
+          <a:effectRef idx="0">
+            <a:schemeClr val="accent1"/>
+          </a:effectRef>
+          <a:fontRef idx="minor">
+            <a:schemeClr val="tx1"/>
+          </a:fontRef>
+        </p:style>
+      </p:cxnSp>
+    </p:spTree>
+    <p:extLst>
+      <p:ext uri="{BB962C8B-B14F-4D97-AF65-F5344CB8AC3E}">
+        <p14:creationId xmlns:p14="http://schemas.microsoft.com/office/powerpoint/2010/main" val="4193469235"/>
       </p:ext>
     </p:extLst>
   </p:cSld>

</xml_diff>